<commit_message>
modification du diapo et des diagrammes
</commit_message>
<xml_diff>
--- a/moto_connectee.pptx
+++ b/moto_connectee.pptx
@@ -8150,6 +8150,18 @@
   <p:clrMapOvr>
     <a:masterClrMapping/>
   </p:clrMapOvr>
+  <mc:AlternateContent xmlns:mc="http://schemas.openxmlformats.org/markup-compatibility/2006">
+    <mc:Choice xmlns:p15="http://schemas.microsoft.com/office/powerpoint/2012/main" Requires="p15">
+      <p:transition xmlns:p14="http://schemas.microsoft.com/office/powerpoint/2010/main" spd="slow" p14:dur="6000">
+        <p15:prstTrans prst="curtains"/>
+      </p:transition>
+    </mc:Choice>
+    <mc:Fallback>
+      <p:transition spd="slow">
+        <p:fade/>
+      </p:transition>
+    </mc:Fallback>
+  </mc:AlternateContent>
   <p:timing>
     <p:tnLst>
       <p:par>
@@ -8240,6 +8252,18 @@
   <p:clrMapOvr>
     <a:masterClrMapping/>
   </p:clrMapOvr>
+  <mc:AlternateContent xmlns:mc="http://schemas.openxmlformats.org/markup-compatibility/2006">
+    <mc:Choice xmlns:p14="http://schemas.microsoft.com/office/powerpoint/2010/main" Requires="p14">
+      <p:transition spd="slow" p14:dur="4400">
+        <p14:honeycomb/>
+      </p:transition>
+    </mc:Choice>
+    <mc:Fallback>
+      <p:transition spd="slow">
+        <p:fade/>
+      </p:transition>
+    </mc:Fallback>
+  </mc:AlternateContent>
   <p:timing>
     <p:tnLst>
       <p:par>
@@ -8308,16 +8332,19 @@
           <a:p>
             <a:pPr rtl="0"/>
             <a:r>
-              <a:rPr lang="fr-FR"/>
-              <a:t>Identifiez les problèmes et les opportunités.</a:t>
-            </a:r>
-          </a:p>
-          <a:p>
-            <a:pPr lvl="1" rtl="0"/>
-            <a:r>
-              <a:rPr lang="fr-FR"/>
-              <a:t>Indiquez les problèmes liés au consommateur et définissez la nature des opportunités qu’ils engendrent en matière de produit/service.</a:t>
-            </a:r>
+              <a:rPr lang="fr-FR" dirty="0" smtClean="0"/>
+              <a:t>Ne pas voler de moto</a:t>
+            </a:r>
+          </a:p>
+          <a:p>
+            <a:pPr rtl="0"/>
+            <a:r>
+              <a:rPr lang="fr-FR" dirty="0" smtClean="0"/>
+              <a:t>*ptr1 &gt; projet</a:t>
+            </a:r>
+          </a:p>
+          <a:p>
+            <a:pPr rtl="0"/>
             <a:endParaRPr lang="fr-FR" dirty="0"/>
           </a:p>
         </p:txBody>
@@ -8327,6 +8354,18 @@
   <p:clrMapOvr>
     <a:masterClrMapping/>
   </p:clrMapOvr>
+  <mc:AlternateContent xmlns:mc="http://schemas.openxmlformats.org/markup-compatibility/2006">
+    <mc:Choice xmlns:p15="http://schemas.microsoft.com/office/powerpoint/2012/main" Requires="p15">
+      <p:transition xmlns:p14="http://schemas.microsoft.com/office/powerpoint/2010/main" spd="slow" p14:dur="2000">
+        <p15:prstTrans prst="crush"/>
+      </p:transition>
+    </mc:Choice>
+    <mc:Fallback>
+      <p:transition spd="slow">
+        <p:fade/>
+      </p:transition>
+    </mc:Fallback>
+  </mc:AlternateContent>
   <p:timing>
     <p:tnLst>
       <p:par>
@@ -8415,6 +8454,18 @@
   <p:clrMapOvr>
     <a:masterClrMapping/>
   </p:clrMapOvr>
+  <mc:AlternateContent xmlns:mc="http://schemas.openxmlformats.org/markup-compatibility/2006">
+    <mc:Choice xmlns:p14="http://schemas.microsoft.com/office/powerpoint/2010/main" Requires="p14">
+      <p:transition spd="slow" p14:dur="2000">
+        <p14:ferris dir="l"/>
+      </p:transition>
+    </mc:Choice>
+    <mc:Fallback>
+      <p:transition spd="slow">
+        <p:fade/>
+      </p:transition>
+    </mc:Fallback>
+  </mc:AlternateContent>
   <p:timing>
     <p:tnLst>
       <p:par>
@@ -8543,6 +8594,18 @@
   <p:clrMapOvr>
     <a:masterClrMapping/>
   </p:clrMapOvr>
+  <mc:AlternateContent xmlns:mc="http://schemas.openxmlformats.org/markup-compatibility/2006">
+    <mc:Choice xmlns:p15="http://schemas.microsoft.com/office/powerpoint/2012/main" Requires="p15">
+      <p:transition xmlns:p14="http://schemas.microsoft.com/office/powerpoint/2010/main" spd="slow" p14:dur="2000">
+        <p15:prstTrans prst="drape"/>
+      </p:transition>
+    </mc:Choice>
+    <mc:Fallback>
+      <p:transition spd="slow">
+        <p:fade/>
+      </p:transition>
+    </mc:Fallback>
+  </mc:AlternateContent>
   <p:timing>
     <p:tnLst>
       <p:par>
@@ -8628,6 +8691,18 @@
   <p:clrMapOvr>
     <a:masterClrMapping/>
   </p:clrMapOvr>
+  <mc:AlternateContent xmlns:mc="http://schemas.openxmlformats.org/markup-compatibility/2006">
+    <mc:Choice xmlns:p14="http://schemas.microsoft.com/office/powerpoint/2010/main" Requires="p14">
+      <p:transition spd="slow" p14:dur="3000">
+        <p14:shred/>
+      </p:transition>
+    </mc:Choice>
+    <mc:Fallback>
+      <p:transition spd="slow">
+        <p:fade/>
+      </p:transition>
+    </mc:Fallback>
+  </mc:AlternateContent>
   <p:timing>
     <p:tnLst>
       <p:par>
@@ -8722,6 +8797,18 @@
   <p:clrMapOvr>
     <a:masterClrMapping/>
   </p:clrMapOvr>
+  <mc:AlternateContent xmlns:mc="http://schemas.openxmlformats.org/markup-compatibility/2006">
+    <mc:Choice xmlns:p14="http://schemas.microsoft.com/office/powerpoint/2010/main" Requires="p14">
+      <p:transition spd="slow" p14:dur="4000">
+        <p14:vortex dir="r"/>
+      </p:transition>
+    </mc:Choice>
+    <mc:Fallback>
+      <p:transition spd="slow">
+        <p:fade/>
+      </p:transition>
+    </mc:Fallback>
+  </mc:AlternateContent>
   <p:timing>
     <p:tnLst>
       <p:par>
@@ -8834,6 +8921,18 @@
   <p:clrMapOvr>
     <a:masterClrMapping/>
   </p:clrMapOvr>
+  <mc:AlternateContent xmlns:mc="http://schemas.openxmlformats.org/markup-compatibility/2006">
+    <mc:Choice xmlns:p14="http://schemas.microsoft.com/office/powerpoint/2010/main" Requires="p14">
+      <p:transition spd="slow" p14:dur="1600">
+        <p14:conveyor dir="l"/>
+      </p:transition>
+    </mc:Choice>
+    <mc:Fallback>
+      <p:transition spd="slow">
+        <p:fade/>
+      </p:transition>
+    </mc:Fallback>
+  </mc:AlternateContent>
   <p:timing>
     <p:tnLst>
       <p:par>
@@ -8939,6 +9038,18 @@
   <p:clrMapOvr>
     <a:masterClrMapping/>
   </p:clrMapOvr>
+  <mc:AlternateContent xmlns:mc="http://schemas.openxmlformats.org/markup-compatibility/2006">
+    <mc:Choice xmlns:p14="http://schemas.microsoft.com/office/powerpoint/2010/main" Requires="p14">
+      <p:transition spd="slow" p14:dur="1600">
+        <p14:conveyor dir="l"/>
+      </p:transition>
+    </mc:Choice>
+    <mc:Fallback>
+      <p:transition spd="slow">
+        <p:fade/>
+      </p:transition>
+    </mc:Fallback>
+  </mc:AlternateContent>
   <p:timing>
     <p:tnLst>
       <p:par>
@@ -9038,6 +9149,18 @@
   <p:clrMapOvr>
     <a:masterClrMapping/>
   </p:clrMapOvr>
+  <mc:AlternateContent xmlns:mc="http://schemas.openxmlformats.org/markup-compatibility/2006">
+    <mc:Choice xmlns:p14="http://schemas.microsoft.com/office/powerpoint/2010/main" Requires="p14">
+      <p:transition spd="slow" p14:dur="1600">
+        <p14:conveyor dir="l"/>
+      </p:transition>
+    </mc:Choice>
+    <mc:Fallback>
+      <p:transition spd="slow">
+        <p:fade/>
+      </p:transition>
+    </mc:Fallback>
+  </mc:AlternateContent>
   <p:timing>
     <p:tnLst>
       <p:par>
@@ -9100,51 +9223,53 @@
         </p:nvSpPr>
         <p:spPr/>
         <p:txBody>
-          <a:bodyPr rtlCol="0"/>
+          <a:bodyPr rtlCol="0">
+            <a:normAutofit/>
+          </a:bodyPr>
           <a:lstStyle/>
           <a:p>
             <a:pPr marL="0" indent="0" rtl="0">
               <a:buNone/>
             </a:pPr>
             <a:r>
-              <a:rPr lang="fr-FR" dirty="0" smtClean="0"/>
+              <a:rPr lang="fr-FR" sz="2400" dirty="0" smtClean="0"/>
               <a:t>	L’équipe est composée de 3 personnes ayant chacun un rôle défini :</a:t>
             </a:r>
           </a:p>
           <a:p>
             <a:pPr rtl="0"/>
             <a:r>
-              <a:rPr lang="fr-FR" dirty="0" smtClean="0"/>
+              <a:rPr lang="fr-FR" sz="2400" dirty="0" smtClean="0"/>
               <a:t>Ferrer-</a:t>
             </a:r>
             <a:r>
-              <a:rPr lang="fr-FR" dirty="0" err="1" smtClean="0"/>
+              <a:rPr lang="fr-FR" sz="2400" dirty="0" err="1" smtClean="0"/>
               <a:t>Doriol</a:t>
             </a:r>
             <a:r>
-              <a:rPr lang="fr-FR" dirty="0" smtClean="0"/>
+              <a:rPr lang="fr-FR" sz="2400" dirty="0" smtClean="0"/>
               <a:t> Denis, qui s’occupera de la partie récupération de données via l’application mobile</a:t>
             </a:r>
-            <a:endParaRPr lang="fr-FR" dirty="0"/>
-          </a:p>
-          <a:p>
-            <a:pPr rtl="0"/>
-            <a:r>
-              <a:rPr lang="fr-FR" dirty="0" smtClean="0"/>
+            <a:endParaRPr lang="fr-FR" sz="2400" dirty="0"/>
+          </a:p>
+          <a:p>
+            <a:pPr rtl="0"/>
+            <a:r>
+              <a:rPr lang="fr-FR" sz="2400" dirty="0" smtClean="0"/>
               <a:t>Duparc Quentin, qui s’occupera de la partie GSM et de l’envoie de SMS en cas de vol</a:t>
             </a:r>
           </a:p>
           <a:p>
             <a:pPr rtl="0"/>
             <a:r>
-              <a:rPr lang="fr-FR" dirty="0" err="1" smtClean="0"/>
+              <a:rPr lang="fr-FR" sz="2400" dirty="0" err="1" smtClean="0"/>
               <a:t>Prévéral</a:t>
             </a:r>
             <a:r>
-              <a:rPr lang="fr-FR" dirty="0" smtClean="0"/>
-              <a:t>	Duncan, qui réalisera</a:t>
-            </a:r>
-            <a:endParaRPr lang="fr-FR" dirty="0"/>
+              <a:rPr lang="fr-FR" sz="2400" dirty="0" smtClean="0"/>
+              <a:t>	Duncan, qui réalisera le programme pour les différents capteurs et pour le stockage des données sur la carte SD</a:t>
+            </a:r>
+            <a:endParaRPr lang="fr-FR" sz="2400" dirty="0"/>
           </a:p>
         </p:txBody>
       </p:sp>
@@ -9153,6 +9278,18 @@
   <p:clrMapOvr>
     <a:masterClrMapping/>
   </p:clrMapOvr>
+  <mc:AlternateContent xmlns:mc="http://schemas.openxmlformats.org/markup-compatibility/2006">
+    <mc:Choice xmlns:p15="http://schemas.microsoft.com/office/powerpoint/2012/main" Requires="p15">
+      <p:transition xmlns:p14="http://schemas.microsoft.com/office/powerpoint/2010/main" spd="slow" p14:dur="2000">
+        <p15:prstTrans prst="wind"/>
+      </p:transition>
+    </mc:Choice>
+    <mc:Fallback>
+      <p:transition spd="slow">
+        <p:fade/>
+      </p:transition>
+    </mc:Fallback>
+  </mc:AlternateContent>
   <p:timing>
     <p:tnLst>
       <p:par>
@@ -9197,10 +9334,9 @@
           <a:p>
             <a:pPr rtl="0"/>
             <a:r>
-              <a:rPr lang="fr-FR"/>
+              <a:rPr lang="fr-FR" dirty="0"/>
               <a:t>Ressources nécessaires</a:t>
             </a:r>
-            <a:endParaRPr lang="fr-FR" dirty="0"/>
           </a:p>
         </p:txBody>
       </p:sp>
@@ -9221,58 +9357,61 @@
           <a:p>
             <a:pPr rtl="0"/>
             <a:r>
-              <a:rPr lang="fr-FR"/>
-              <a:t>Énumérez les exigences concernant les ressources suivantes :</a:t>
-            </a:r>
-          </a:p>
-          <a:p>
-            <a:pPr lvl="1" rtl="0"/>
-            <a:r>
-              <a:rPr lang="fr-FR"/>
-              <a:t>Personnel</a:t>
-            </a:r>
-          </a:p>
-          <a:p>
-            <a:pPr lvl="1" rtl="0"/>
-            <a:r>
-              <a:rPr lang="fr-FR"/>
-              <a:t>Technologie</a:t>
-            </a:r>
-          </a:p>
-          <a:p>
-            <a:pPr lvl="1" rtl="0"/>
-            <a:r>
-              <a:rPr lang="fr-FR"/>
-              <a:t>Finances</a:t>
-            </a:r>
-          </a:p>
-          <a:p>
-            <a:pPr lvl="1" rtl="0"/>
-            <a:r>
-              <a:rPr lang="fr-FR"/>
-              <a:t>Distribution</a:t>
-            </a:r>
-          </a:p>
-          <a:p>
-            <a:pPr lvl="1" rtl="0"/>
-            <a:r>
-              <a:rPr lang="fr-FR"/>
-              <a:t>Promotion</a:t>
-            </a:r>
-          </a:p>
-          <a:p>
-            <a:pPr lvl="1" rtl="0"/>
-            <a:r>
-              <a:rPr lang="fr-FR"/>
-              <a:t>Produits</a:t>
-            </a:r>
-          </a:p>
-          <a:p>
-            <a:pPr lvl="1" rtl="0"/>
-            <a:r>
-              <a:rPr lang="fr-FR"/>
-              <a:t>Services</a:t>
-            </a:r>
+              <a:rPr lang="fr-FR" dirty="0" smtClean="0"/>
+              <a:t>Module micro SD</a:t>
+            </a:r>
+          </a:p>
+          <a:p>
+            <a:pPr rtl="0"/>
+            <a:r>
+              <a:rPr lang="fr-FR" dirty="0" err="1" smtClean="0"/>
+              <a:t>Buzzer</a:t>
+            </a:r>
+            <a:r>
+              <a:rPr lang="fr-FR" dirty="0" smtClean="0"/>
+              <a:t> piézo</a:t>
+            </a:r>
+            <a:r>
+              <a:rPr lang="fr-FR" dirty="0" smtClean="0"/>
+              <a:t>él</a:t>
+            </a:r>
+            <a:r>
+              <a:rPr lang="fr-FR" dirty="0" smtClean="0"/>
+              <a:t>ectrique</a:t>
+            </a:r>
+          </a:p>
+          <a:p>
+            <a:pPr rtl="0"/>
+            <a:r>
+              <a:rPr lang="fr-FR" dirty="0" smtClean="0"/>
+              <a:t>Capteur GPS avec une sortie NMEA</a:t>
+            </a:r>
+          </a:p>
+          <a:p>
+            <a:pPr rtl="0"/>
+            <a:r>
+              <a:rPr lang="fr-FR" dirty="0" smtClean="0"/>
+              <a:t>Tablette avec un OS </a:t>
+            </a:r>
+            <a:r>
+              <a:rPr lang="fr-FR" dirty="0" err="1" smtClean="0"/>
+              <a:t>android</a:t>
+            </a:r>
+            <a:endParaRPr lang="fr-FR" dirty="0" smtClean="0"/>
+          </a:p>
+          <a:p>
+            <a:pPr rtl="0"/>
+            <a:r>
+              <a:rPr lang="fr-FR" dirty="0" err="1" smtClean="0"/>
+              <a:t>Telephone</a:t>
+            </a:r>
+            <a:r>
+              <a:rPr lang="fr-FR" dirty="0" smtClean="0"/>
+              <a:t> avec une carte SIM</a:t>
+            </a:r>
+          </a:p>
+          <a:p>
+            <a:pPr rtl="0"/>
             <a:endParaRPr lang="fr-FR" dirty="0"/>
           </a:p>
         </p:txBody>
@@ -9282,6 +9421,18 @@
   <p:clrMapOvr>
     <a:masterClrMapping/>
   </p:clrMapOvr>
+  <mc:AlternateContent xmlns:mc="http://schemas.openxmlformats.org/markup-compatibility/2006">
+    <mc:Choice xmlns:p14="http://schemas.microsoft.com/office/powerpoint/2010/main" Requires="p14">
+      <p:transition spd="slow" p14:dur="1600">
+        <p14:prism isContent="1" isInverted="1"/>
+      </p:transition>
+    </mc:Choice>
+    <mc:Fallback>
+      <p:transition spd="slow">
+        <p:fade/>
+      </p:transition>
+    </mc:Fallback>
+  </mc:AlternateContent>
   <p:timing>
     <p:tnLst>
       <p:par>

</xml_diff>

<commit_message>
Nouveau diaporama de présentation du projet
</commit_message>
<xml_diff>
--- a/moto_connectee.pptx
+++ b/moto_connectee.pptx
@@ -5,10 +5,10 @@
     <p:sldMasterId id="2147483648" r:id="rId1"/>
   </p:sldMasterIdLst>
   <p:notesMasterIdLst>
-    <p:notesMasterId r:id="rId14"/>
+    <p:notesMasterId r:id="rId23"/>
   </p:notesMasterIdLst>
   <p:handoutMasterIdLst>
-    <p:handoutMasterId r:id="rId15"/>
+    <p:handoutMasterId r:id="rId24"/>
   </p:handoutMasterIdLst>
   <p:sldIdLst>
     <p:sldId id="257" r:id="rId2"/>
@@ -18,14 +18,41 @@
     <p:sldId id="272" r:id="rId6"/>
     <p:sldId id="273" r:id="rId7"/>
     <p:sldId id="274" r:id="rId8"/>
-    <p:sldId id="260" r:id="rId9"/>
-    <p:sldId id="266" r:id="rId10"/>
-    <p:sldId id="265" r:id="rId11"/>
+    <p:sldId id="276" r:id="rId9"/>
+    <p:sldId id="260" r:id="rId10"/>
+    <p:sldId id="266" r:id="rId11"/>
     <p:sldId id="262" r:id="rId12"/>
-    <p:sldId id="271" r:id="rId13"/>
+    <p:sldId id="275" r:id="rId13"/>
+    <p:sldId id="277" r:id="rId14"/>
+    <p:sldId id="278" r:id="rId15"/>
+    <p:sldId id="279" r:id="rId16"/>
+    <p:sldId id="280" r:id="rId17"/>
+    <p:sldId id="281" r:id="rId18"/>
+    <p:sldId id="282" r:id="rId19"/>
+    <p:sldId id="283" r:id="rId20"/>
+    <p:sldId id="284" r:id="rId21"/>
+    <p:sldId id="285" r:id="rId22"/>
   </p:sldIdLst>
   <p:sldSz cx="12192000" cy="6858000"/>
   <p:notesSz cx="7023100" cy="9309100"/>
+  <p:custShowLst>
+    <p:custShow name="Diaporama personnalisé 1" id="0">
+      <p:sldLst>
+        <p:sld r:id="rId2"/>
+        <p:sld r:id="rId3"/>
+        <p:sld r:id="rId4"/>
+        <p:sld r:id="rId5"/>
+        <p:sld r:id="rId6"/>
+        <p:sld r:id="rId7"/>
+        <p:sld r:id="rId8"/>
+        <p:sld r:id="rId9"/>
+        <p:sld r:id="rId10"/>
+        <p:sld r:id="rId11"/>
+        <p:sld r:id="rId12"/>
+        <p:sld r:id="rId13"/>
+      </p:sldLst>
+    </p:custShow>
+  </p:custShowLst>
   <p:defaultTextStyle>
     <a:defPPr rtl="0">
       <a:defRPr lang="fr-FR"/>
@@ -122,6 +149,39 @@
     </a:lvl9pPr>
   </p:defaultTextStyle>
   <p:extLst>
+    <p:ext uri="{521415D9-36F7-43E2-AB2F-B90AF26B5E84}">
+      <p14:sectionLst xmlns:p14="http://schemas.microsoft.com/office/powerpoint/2010/main">
+        <p14:section name="Section par défaut" id="{51434B66-E536-4E12-8EE6-6AD5E3472823}">
+          <p14:sldIdLst>
+            <p14:sldId id="257"/>
+            <p14:sldId id="263"/>
+            <p14:sldId id="264"/>
+            <p14:sldId id="261"/>
+            <p14:sldId id="272"/>
+            <p14:sldId id="273"/>
+            <p14:sldId id="274"/>
+            <p14:sldId id="276"/>
+            <p14:sldId id="260"/>
+            <p14:sldId id="266"/>
+            <p14:sldId id="262"/>
+            <p14:sldId id="275"/>
+          </p14:sldIdLst>
+        </p14:section>
+        <p14:section name="Section sans titre" id="{D6BA8653-AF17-47F2-9E5B-42B2A9F5A283}">
+          <p14:sldIdLst>
+            <p14:sldId id="277"/>
+            <p14:sldId id="278"/>
+            <p14:sldId id="279"/>
+            <p14:sldId id="280"/>
+            <p14:sldId id="281"/>
+            <p14:sldId id="282"/>
+            <p14:sldId id="283"/>
+            <p14:sldId id="284"/>
+            <p14:sldId id="285"/>
+          </p14:sldIdLst>
+        </p14:section>
+      </p14:sectionLst>
+    </p:ext>
     <p:ext uri="{EFAFB233-063F-42B5-8137-9DF3F51BA10A}">
       <p15:sldGuideLst xmlns:p15="http://schemas.microsoft.com/office/powerpoint/2012/main"/>
     </p:ext>
@@ -220,7 +280,7 @@
             <a:pPr rtl="0"/>
             <a:fld id="{3F0099FA-2C6C-41A5-86E0-FD784F45435F}" type="datetime1">
               <a:rPr lang="fr-FR" smtClean="0"/>
-              <a:t>14/01/2019</a:t>
+              <a:t>16/01/2019</a:t>
             </a:fld>
             <a:endParaRPr lang="fr-FR" dirty="0"/>
           </a:p>
@@ -390,7 +450,7 @@
             <a:pPr rtl="0"/>
             <a:fld id="{70EEEE83-C435-440D-AF56-A958751411A4}" type="datetime1">
               <a:rPr lang="fr-FR" smtClean="0"/>
-              <a:t>14/01/2019</a:t>
+              <a:t>16/01/2019</a:t>
             </a:fld>
             <a:endParaRPr lang="fr-FR" dirty="0"/>
           </a:p>
@@ -1088,7 +1148,7 @@
             <a:fld id="{5257B995-136A-4A15-87A5-26420C3C1021}" type="slidenum">
               <a:rPr lang="fr-FR" smtClean="0"/>
               <a:pPr rtl="0"/>
-              <a:t>8</a:t>
+              <a:t>9</a:t>
             </a:fld>
             <a:endParaRPr lang="fr-FR"/>
           </a:p>
@@ -1177,7 +1237,7 @@
             <a:fld id="{5257B995-136A-4A15-87A5-26420C3C1021}" type="slidenum">
               <a:rPr lang="fr-FR" smtClean="0"/>
               <a:pPr rtl="0"/>
-              <a:t>9</a:t>
+              <a:t>10</a:t>
             </a:fld>
             <a:endParaRPr lang="fr-FR"/>
           </a:p>
@@ -1266,95 +1326,6 @@
             <a:fld id="{5257B995-136A-4A15-87A5-26420C3C1021}" type="slidenum">
               <a:rPr lang="fr-FR" smtClean="0"/>
               <a:pPr rtl="0"/>
-              <a:t>10</a:t>
-            </a:fld>
-            <a:endParaRPr lang="fr-FR"/>
-          </a:p>
-        </p:txBody>
-      </p:sp>
-    </p:spTree>
-    <p:extLst>
-      <p:ext uri="{BB962C8B-B14F-4D97-AF65-F5344CB8AC3E}">
-        <p14:creationId xmlns:p14="http://schemas.microsoft.com/office/powerpoint/2010/main" val="1443886653"/>
-      </p:ext>
-    </p:extLst>
-  </p:cSld>
-  <p:clrMapOvr>
-    <a:masterClrMapping/>
-  </p:clrMapOvr>
-</p:notes>
-</file>
-
-<file path=ppt/notesSlides/notesSlide8.xml><?xml version="1.0" encoding="utf-8"?>
-<p:notes xmlns:a="http://schemas.openxmlformats.org/drawingml/2006/main" xmlns:r="http://schemas.openxmlformats.org/officeDocument/2006/relationships" xmlns:p="http://schemas.openxmlformats.org/presentationml/2006/main">
-  <p:cSld>
-    <p:spTree>
-      <p:nvGrpSpPr>
-        <p:cNvPr id="1" name=""/>
-        <p:cNvGrpSpPr/>
-        <p:nvPr/>
-      </p:nvGrpSpPr>
-      <p:grpSpPr>
-        <a:xfrm>
-          <a:off x="0" y="0"/>
-          <a:ext cx="0" cy="0"/>
-          <a:chOff x="0" y="0"/>
-          <a:chExt cx="0" cy="0"/>
-        </a:xfrm>
-      </p:grpSpPr>
-      <p:sp>
-        <p:nvSpPr>
-          <p:cNvPr id="2" name="Espace réservé de l’image des diapositives 1"/>
-          <p:cNvSpPr>
-            <a:spLocks noGrp="1" noRot="1" noChangeAspect="1"/>
-          </p:cNvSpPr>
-          <p:nvPr>
-            <p:ph type="sldImg"/>
-          </p:nvPr>
-        </p:nvSpPr>
-        <p:spPr/>
-      </p:sp>
-      <p:sp>
-        <p:nvSpPr>
-          <p:cNvPr id="3" name="Espace réservé des commentaires 2"/>
-          <p:cNvSpPr>
-            <a:spLocks noGrp="1"/>
-          </p:cNvSpPr>
-          <p:nvPr>
-            <p:ph type="body" idx="1"/>
-          </p:nvPr>
-        </p:nvSpPr>
-        <p:spPr/>
-        <p:txBody>
-          <a:bodyPr rtlCol="0">
-            <a:normAutofit/>
-          </a:bodyPr>
-          <a:lstStyle/>
-          <a:p>
-            <a:pPr rtl="0"/>
-            <a:endParaRPr lang="fr-FR"/>
-          </a:p>
-        </p:txBody>
-      </p:sp>
-      <p:sp>
-        <p:nvSpPr>
-          <p:cNvPr id="4" name="Espace réservé du numéro de diapositive 3"/>
-          <p:cNvSpPr>
-            <a:spLocks noGrp="1"/>
-          </p:cNvSpPr>
-          <p:nvPr>
-            <p:ph type="sldNum" sz="quarter" idx="10"/>
-          </p:nvPr>
-        </p:nvSpPr>
-        <p:spPr/>
-        <p:txBody>
-          <a:bodyPr rtlCol="0"/>
-          <a:lstStyle/>
-          <a:p>
-            <a:pPr rtl="0"/>
-            <a:fld id="{5257B995-136A-4A15-87A5-26420C3C1021}" type="slidenum">
-              <a:rPr lang="fr-FR" smtClean="0"/>
-              <a:pPr rtl="0"/>
               <a:t>11</a:t>
             </a:fld>
             <a:endParaRPr lang="fr-FR"/>
@@ -1365,91 +1336,6 @@
     <p:extLst>
       <p:ext uri="{BB962C8B-B14F-4D97-AF65-F5344CB8AC3E}">
         <p14:creationId xmlns:p14="http://schemas.microsoft.com/office/powerpoint/2010/main" val="3822894131"/>
-      </p:ext>
-    </p:extLst>
-  </p:cSld>
-  <p:clrMapOvr>
-    <a:masterClrMapping/>
-  </p:clrMapOvr>
-</p:notes>
-</file>
-
-<file path=ppt/notesSlides/notesSlide9.xml><?xml version="1.0" encoding="utf-8"?>
-<p:notes xmlns:a="http://schemas.openxmlformats.org/drawingml/2006/main" xmlns:r="http://schemas.openxmlformats.org/officeDocument/2006/relationships" xmlns:p="http://schemas.openxmlformats.org/presentationml/2006/main">
-  <p:cSld>
-    <p:spTree>
-      <p:nvGrpSpPr>
-        <p:cNvPr id="1" name=""/>
-        <p:cNvGrpSpPr/>
-        <p:nvPr/>
-      </p:nvGrpSpPr>
-      <p:grpSpPr>
-        <a:xfrm>
-          <a:off x="0" y="0"/>
-          <a:ext cx="0" cy="0"/>
-          <a:chOff x="0" y="0"/>
-          <a:chExt cx="0" cy="0"/>
-        </a:xfrm>
-      </p:grpSpPr>
-      <p:sp>
-        <p:nvSpPr>
-          <p:cNvPr id="2" name="Espace réservé de l'image des diapositives 1"/>
-          <p:cNvSpPr>
-            <a:spLocks noGrp="1" noRot="1" noChangeAspect="1"/>
-          </p:cNvSpPr>
-          <p:nvPr>
-            <p:ph type="sldImg"/>
-          </p:nvPr>
-        </p:nvSpPr>
-        <p:spPr/>
-      </p:sp>
-      <p:sp>
-        <p:nvSpPr>
-          <p:cNvPr id="3" name="Espace réservé des notes 2"/>
-          <p:cNvSpPr>
-            <a:spLocks noGrp="1"/>
-          </p:cNvSpPr>
-          <p:nvPr>
-            <p:ph type="body" idx="1"/>
-          </p:nvPr>
-        </p:nvSpPr>
-        <p:spPr/>
-        <p:txBody>
-          <a:bodyPr/>
-          <a:lstStyle/>
-          <a:p>
-            <a:endParaRPr lang="fr-FR" dirty="0"/>
-          </a:p>
-        </p:txBody>
-      </p:sp>
-      <p:sp>
-        <p:nvSpPr>
-          <p:cNvPr id="4" name="Espace réservé du numéro de diapositive 3"/>
-          <p:cNvSpPr>
-            <a:spLocks noGrp="1"/>
-          </p:cNvSpPr>
-          <p:nvPr>
-            <p:ph type="sldNum" sz="quarter" idx="10"/>
-          </p:nvPr>
-        </p:nvSpPr>
-        <p:spPr/>
-        <p:txBody>
-          <a:bodyPr/>
-          <a:lstStyle/>
-          <a:p>
-            <a:pPr rtl="0"/>
-            <a:fld id="{333E963C-1534-4F8D-B2A7-66D81AA25953}" type="slidenum">
-              <a:rPr lang="fr-FR" smtClean="0"/>
-              <a:t>12</a:t>
-            </a:fld>
-            <a:endParaRPr lang="fr-FR" dirty="0"/>
-          </a:p>
-        </p:txBody>
-      </p:sp>
-    </p:spTree>
-    <p:extLst>
-      <p:ext uri="{BB962C8B-B14F-4D97-AF65-F5344CB8AC3E}">
-        <p14:creationId xmlns:p14="http://schemas.microsoft.com/office/powerpoint/2010/main" val="418056637"/>
       </p:ext>
     </p:extLst>
   </p:cSld>
@@ -1648,7 +1534,7 @@
             <a:pPr rtl="0"/>
             <a:fld id="{EEA1CE3C-966D-4FD0-84F1-659D92CC71E7}" type="datetime1">
               <a:rPr lang="fr-FR" smtClean="0"/>
-              <a:t>14/01/2019</a:t>
+              <a:t>16/01/2019</a:t>
             </a:fld>
             <a:endParaRPr lang="fr-FR" dirty="0"/>
           </a:p>
@@ -1707,6 +1593,18 @@
   <p:clrMapOvr>
     <a:masterClrMapping/>
   </p:clrMapOvr>
+  <mc:AlternateContent xmlns:mc="http://schemas.openxmlformats.org/markup-compatibility/2006">
+    <mc:Choice xmlns:p14="http://schemas.microsoft.com/office/powerpoint/2010/main" Requires="p14">
+      <p:transition spd="slow" p14:dur="1200">
+        <p14:prism dir="u"/>
+      </p:transition>
+    </mc:Choice>
+    <mc:Fallback>
+      <p:transition spd="slow">
+        <p:fade/>
+      </p:transition>
+    </mc:Fallback>
+  </mc:AlternateContent>
 </p:sldLayout>
 </file>
 
@@ -1928,7 +1826,7 @@
             <a:pPr rtl="0"/>
             <a:fld id="{D4FE0B58-8825-4392-8072-04DA5769DCBC}" type="datetime1">
               <a:rPr lang="fr-FR" smtClean="0"/>
-              <a:t>14/01/2019</a:t>
+              <a:t>16/01/2019</a:t>
             </a:fld>
             <a:endParaRPr lang="fr-FR" dirty="0"/>
           </a:p>
@@ -1987,6 +1885,18 @@
   <p:clrMapOvr>
     <a:masterClrMapping/>
   </p:clrMapOvr>
+  <mc:AlternateContent xmlns:mc="http://schemas.openxmlformats.org/markup-compatibility/2006">
+    <mc:Choice xmlns:p14="http://schemas.microsoft.com/office/powerpoint/2010/main" Requires="p14">
+      <p:transition spd="slow" p14:dur="1200">
+        <p14:prism dir="u"/>
+      </p:transition>
+    </mc:Choice>
+    <mc:Fallback>
+      <p:transition spd="slow">
+        <p:fade/>
+      </p:transition>
+    </mc:Fallback>
+  </mc:AlternateContent>
 </p:sldLayout>
 </file>
 
@@ -2126,7 +2036,7 @@
             <a:pPr rtl="0"/>
             <a:fld id="{ADD2C4CC-92E4-4A64-9AD6-3F9FAD460695}" type="datetime1">
               <a:rPr lang="fr-FR" smtClean="0"/>
-              <a:t>14/01/2019</a:t>
+              <a:t>16/01/2019</a:t>
             </a:fld>
             <a:endParaRPr lang="fr-FR" dirty="0"/>
           </a:p>
@@ -2185,6 +2095,18 @@
   <p:clrMapOvr>
     <a:masterClrMapping/>
   </p:clrMapOvr>
+  <mc:AlternateContent xmlns:mc="http://schemas.openxmlformats.org/markup-compatibility/2006">
+    <mc:Choice xmlns:p14="http://schemas.microsoft.com/office/powerpoint/2010/main" Requires="p14">
+      <p:transition spd="slow" p14:dur="1200">
+        <p14:prism dir="u"/>
+      </p:transition>
+    </mc:Choice>
+    <mc:Fallback>
+      <p:transition spd="slow">
+        <p:fade/>
+      </p:transition>
+    </mc:Fallback>
+  </mc:AlternateContent>
 </p:sldLayout>
 </file>
 
@@ -2467,7 +2389,7 @@
             <a:pPr rtl="0"/>
             <a:fld id="{7FC0E82F-DF84-4890-B98B-D1EC6D9B0C17}" type="datetime1">
               <a:rPr lang="fr-FR" smtClean="0"/>
-              <a:t>14/01/2019</a:t>
+              <a:t>16/01/2019</a:t>
             </a:fld>
             <a:endParaRPr lang="fr-FR" dirty="0"/>
           </a:p>
@@ -2526,6 +2448,18 @@
   <p:clrMapOvr>
     <a:masterClrMapping/>
   </p:clrMapOvr>
+  <mc:AlternateContent xmlns:mc="http://schemas.openxmlformats.org/markup-compatibility/2006">
+    <mc:Choice xmlns:p14="http://schemas.microsoft.com/office/powerpoint/2010/main" Requires="p14">
+      <p:transition spd="slow" p14:dur="1200">
+        <p14:prism dir="u"/>
+      </p:transition>
+    </mc:Choice>
+    <mc:Fallback>
+      <p:transition spd="slow">
+        <p:fade/>
+      </p:transition>
+    </mc:Fallback>
+  </mc:AlternateContent>
 </p:sldLayout>
 </file>
 
@@ -2718,7 +2652,7 @@
             <a:pPr rtl="0"/>
             <a:fld id="{4AA75B7D-E626-4A46-B564-1EAC7D2EC629}" type="datetime1">
               <a:rPr lang="fr-FR" smtClean="0"/>
-              <a:t>14/01/2019</a:t>
+              <a:t>16/01/2019</a:t>
             </a:fld>
             <a:endParaRPr lang="fr-FR" dirty="0"/>
           </a:p>
@@ -2777,6 +2711,18 @@
   <p:clrMapOvr>
     <a:masterClrMapping/>
   </p:clrMapOvr>
+  <mc:AlternateContent xmlns:mc="http://schemas.openxmlformats.org/markup-compatibility/2006">
+    <mc:Choice xmlns:p14="http://schemas.microsoft.com/office/powerpoint/2010/main" Requires="p14">
+      <p:transition spd="slow" p14:dur="1200">
+        <p14:prism dir="u"/>
+      </p:transition>
+    </mc:Choice>
+    <mc:Fallback>
+      <p:transition spd="slow">
+        <p:fade/>
+      </p:transition>
+    </mc:Fallback>
+  </mc:AlternateContent>
 </p:sldLayout>
 </file>
 
@@ -3022,7 +2968,7 @@
             <a:pPr rtl="0"/>
             <a:fld id="{49BD8BC7-BD2B-48B2-9872-5FC5845B7926}" type="datetime1">
               <a:rPr lang="fr-FR" smtClean="0"/>
-              <a:t>14/01/2019</a:t>
+              <a:t>16/01/2019</a:t>
             </a:fld>
             <a:endParaRPr lang="fr-FR" dirty="0"/>
           </a:p>
@@ -3081,6 +3027,18 @@
   <p:clrMapOvr>
     <a:masterClrMapping/>
   </p:clrMapOvr>
+  <mc:AlternateContent xmlns:mc="http://schemas.openxmlformats.org/markup-compatibility/2006">
+    <mc:Choice xmlns:p14="http://schemas.microsoft.com/office/powerpoint/2010/main" Requires="p14">
+      <p:transition spd="slow" p14:dur="1200">
+        <p14:prism dir="u"/>
+      </p:transition>
+    </mc:Choice>
+    <mc:Fallback>
+      <p:transition spd="slow">
+        <p:fade/>
+      </p:transition>
+    </mc:Fallback>
+  </mc:AlternateContent>
 </p:sldLayout>
 </file>
 
@@ -3298,7 +3256,7 @@
             <a:pPr rtl="0"/>
             <a:fld id="{03380E09-6EB4-4674-9DFF-B94578B57456}" type="datetime1">
               <a:rPr lang="fr-FR" smtClean="0"/>
-              <a:t>14/01/2019</a:t>
+              <a:t>16/01/2019</a:t>
             </a:fld>
             <a:endParaRPr lang="fr-FR" dirty="0"/>
           </a:p>
@@ -3357,6 +3315,18 @@
   <p:clrMapOvr>
     <a:masterClrMapping/>
   </p:clrMapOvr>
+  <mc:AlternateContent xmlns:mc="http://schemas.openxmlformats.org/markup-compatibility/2006">
+    <mc:Choice xmlns:p14="http://schemas.microsoft.com/office/powerpoint/2010/main" Requires="p14">
+      <p:transition spd="slow" p14:dur="1200">
+        <p14:prism dir="u"/>
+      </p:transition>
+    </mc:Choice>
+    <mc:Fallback>
+      <p:transition spd="slow">
+        <p:fade/>
+      </p:transition>
+    </mc:Fallback>
+  </mc:AlternateContent>
 </p:sldLayout>
 </file>
 
@@ -3930,7 +3900,7 @@
             <a:pPr rtl="0"/>
             <a:fld id="{1248D333-CBC8-4085-A2F1-259D0FDABA2A}" type="datetime1">
               <a:rPr lang="fr-FR" smtClean="0"/>
-              <a:t>14/01/2019</a:t>
+              <a:t>16/01/2019</a:t>
             </a:fld>
             <a:endParaRPr lang="fr-FR" dirty="0"/>
           </a:p>
@@ -3989,6 +3959,18 @@
   <p:clrMapOvr>
     <a:masterClrMapping/>
   </p:clrMapOvr>
+  <mc:AlternateContent xmlns:mc="http://schemas.openxmlformats.org/markup-compatibility/2006">
+    <mc:Choice xmlns:p14="http://schemas.microsoft.com/office/powerpoint/2010/main" Requires="p14">
+      <p:transition spd="slow" p14:dur="1200">
+        <p14:prism dir="u"/>
+      </p:transition>
+    </mc:Choice>
+    <mc:Fallback>
+      <p:transition spd="slow">
+        <p:fade/>
+      </p:transition>
+    </mc:Fallback>
+  </mc:AlternateContent>
 </p:sldLayout>
 </file>
 
@@ -4802,7 +4784,7 @@
             <a:pPr rtl="0"/>
             <a:fld id="{AFDE6A74-7A99-4D9C-8094-0B6E5F5A4735}" type="datetime1">
               <a:rPr lang="fr-FR" smtClean="0"/>
-              <a:t>14/01/2019</a:t>
+              <a:t>16/01/2019</a:t>
             </a:fld>
             <a:endParaRPr lang="fr-FR" dirty="0"/>
           </a:p>
@@ -4861,6 +4843,18 @@
   <p:clrMapOvr>
     <a:masterClrMapping/>
   </p:clrMapOvr>
+  <mc:AlternateContent xmlns:mc="http://schemas.openxmlformats.org/markup-compatibility/2006">
+    <mc:Choice xmlns:p14="http://schemas.microsoft.com/office/powerpoint/2010/main" Requires="p14">
+      <p:transition spd="slow" p14:dur="1200">
+        <p14:prism dir="u"/>
+      </p:transition>
+    </mc:Choice>
+    <mc:Fallback>
+      <p:transition spd="slow">
+        <p:fade/>
+      </p:transition>
+    </mc:Fallback>
+  </mc:AlternateContent>
 </p:sldLayout>
 </file>
 
@@ -4975,7 +4969,7 @@
             <a:pPr rtl="0"/>
             <a:fld id="{B3926C99-5AB8-493E-B1E7-9C6CEDC2454E}" type="datetime1">
               <a:rPr lang="fr-FR" smtClean="0"/>
-              <a:t>14/01/2019</a:t>
+              <a:t>16/01/2019</a:t>
             </a:fld>
             <a:endParaRPr lang="fr-FR" dirty="0"/>
           </a:p>
@@ -5034,6 +5028,18 @@
   <p:clrMapOvr>
     <a:masterClrMapping/>
   </p:clrMapOvr>
+  <mc:AlternateContent xmlns:mc="http://schemas.openxmlformats.org/markup-compatibility/2006">
+    <mc:Choice xmlns:p14="http://schemas.microsoft.com/office/powerpoint/2010/main" Requires="p14">
+      <p:transition spd="slow" p14:dur="1200">
+        <p14:prism dir="u"/>
+      </p:transition>
+    </mc:Choice>
+    <mc:Fallback>
+      <p:transition spd="slow">
+        <p:fade/>
+      </p:transition>
+    </mc:Fallback>
+  </mc:AlternateContent>
 </p:sldLayout>
 </file>
 
@@ -5158,7 +5164,7 @@
             <a:pPr rtl="0"/>
             <a:fld id="{FB4778F0-12A3-4976-905B-76B4D728E142}" type="datetime1">
               <a:rPr lang="fr-FR" smtClean="0"/>
-              <a:t>14/01/2019</a:t>
+              <a:t>16/01/2019</a:t>
             </a:fld>
             <a:endParaRPr lang="fr-FR" dirty="0"/>
           </a:p>
@@ -5217,6 +5223,18 @@
   <p:clrMapOvr>
     <a:masterClrMapping/>
   </p:clrMapOvr>
+  <mc:AlternateContent xmlns:mc="http://schemas.openxmlformats.org/markup-compatibility/2006">
+    <mc:Choice xmlns:p14="http://schemas.microsoft.com/office/powerpoint/2010/main" Requires="p14">
+      <p:transition spd="slow" p14:dur="1200">
+        <p14:prism dir="u"/>
+      </p:transition>
+    </mc:Choice>
+    <mc:Fallback>
+      <p:transition spd="slow">
+        <p:fade/>
+      </p:transition>
+    </mc:Fallback>
+  </mc:AlternateContent>
 </p:sldLayout>
 </file>
 
@@ -5331,7 +5349,7 @@
             <a:pPr rtl="0"/>
             <a:fld id="{5C23223D-68FF-4DD6-9A39-B92579FB5BBF}" type="datetime1">
               <a:rPr lang="fr-FR" smtClean="0"/>
-              <a:t>14/01/2019</a:t>
+              <a:t>16/01/2019</a:t>
             </a:fld>
             <a:endParaRPr lang="fr-FR" dirty="0"/>
           </a:p>
@@ -5390,6 +5408,18 @@
   <p:clrMapOvr>
     <a:masterClrMapping/>
   </p:clrMapOvr>
+  <mc:AlternateContent xmlns:mc="http://schemas.openxmlformats.org/markup-compatibility/2006">
+    <mc:Choice xmlns:p14="http://schemas.microsoft.com/office/powerpoint/2010/main" Requires="p14">
+      <p:transition spd="slow" p14:dur="1200">
+        <p14:prism dir="u"/>
+      </p:transition>
+    </mc:Choice>
+    <mc:Fallback>
+      <p:transition spd="slow">
+        <p:fade/>
+      </p:transition>
+    </mc:Fallback>
+  </mc:AlternateContent>
 </p:sldLayout>
 </file>
 
@@ -5582,7 +5612,7 @@
             <a:pPr rtl="0"/>
             <a:fld id="{499C1873-94D5-4799-BB2B-CC98951847AC}" type="datetime1">
               <a:rPr lang="fr-FR" smtClean="0"/>
-              <a:t>14/01/2019</a:t>
+              <a:t>16/01/2019</a:t>
             </a:fld>
             <a:endParaRPr lang="fr-FR" dirty="0"/>
           </a:p>
@@ -5641,6 +5671,18 @@
   <p:clrMapOvr>
     <a:masterClrMapping/>
   </p:clrMapOvr>
+  <mc:AlternateContent xmlns:mc="http://schemas.openxmlformats.org/markup-compatibility/2006">
+    <mc:Choice xmlns:p14="http://schemas.microsoft.com/office/powerpoint/2010/main" Requires="p14">
+      <p:transition spd="slow" p14:dur="1200">
+        <p14:prism dir="u"/>
+      </p:transition>
+    </mc:Choice>
+    <mc:Fallback>
+      <p:transition spd="slow">
+        <p:fade/>
+      </p:transition>
+    </mc:Fallback>
+  </mc:AlternateContent>
 </p:sldLayout>
 </file>
 
@@ -5877,7 +5919,7 @@
             <a:pPr rtl="0"/>
             <a:fld id="{779FC038-AF51-43FA-AAF8-A0A2FF4A7D9E}" type="datetime1">
               <a:rPr lang="fr-FR" smtClean="0"/>
-              <a:t>14/01/2019</a:t>
+              <a:t>16/01/2019</a:t>
             </a:fld>
             <a:endParaRPr lang="fr-FR" dirty="0"/>
           </a:p>
@@ -5936,6 +5978,18 @@
   <p:clrMapOvr>
     <a:masterClrMapping/>
   </p:clrMapOvr>
+  <mc:AlternateContent xmlns:mc="http://schemas.openxmlformats.org/markup-compatibility/2006">
+    <mc:Choice xmlns:p14="http://schemas.microsoft.com/office/powerpoint/2010/main" Requires="p14">
+      <p:transition spd="slow" p14:dur="1200">
+        <p14:prism dir="u"/>
+      </p:transition>
+    </mc:Choice>
+    <mc:Fallback>
+      <p:transition spd="slow">
+        <p:fade/>
+      </p:transition>
+    </mc:Fallback>
+  </mc:AlternateContent>
 </p:sldLayout>
 </file>
 
@@ -6326,7 +6380,7 @@
             <a:pPr rtl="0"/>
             <a:fld id="{AA9F26FC-3F5E-40A1-9B94-241E071CECA3}" type="datetime1">
               <a:rPr lang="fr-FR" smtClean="0"/>
-              <a:t>14/01/2019</a:t>
+              <a:t>16/01/2019</a:t>
             </a:fld>
             <a:endParaRPr lang="fr-FR" dirty="0"/>
           </a:p>
@@ -6385,6 +6439,18 @@
   <p:clrMapOvr>
     <a:masterClrMapping/>
   </p:clrMapOvr>
+  <mc:AlternateContent xmlns:mc="http://schemas.openxmlformats.org/markup-compatibility/2006">
+    <mc:Choice xmlns:p14="http://schemas.microsoft.com/office/powerpoint/2010/main" Requires="p14">
+      <p:transition spd="slow" p14:dur="1200">
+        <p14:prism dir="u"/>
+      </p:transition>
+    </mc:Choice>
+    <mc:Fallback>
+      <p:transition spd="slow">
+        <p:fade/>
+      </p:transition>
+    </mc:Fallback>
+  </mc:AlternateContent>
 </p:sldLayout>
 </file>
 
@@ -6447,7 +6513,7 @@
             <a:pPr rtl="0"/>
             <a:fld id="{51CEAF52-E6F9-4E1F-B67D-94DE0362FD20}" type="datetime1">
               <a:rPr lang="fr-FR" smtClean="0"/>
-              <a:t>14/01/2019</a:t>
+              <a:t>16/01/2019</a:t>
             </a:fld>
             <a:endParaRPr lang="fr-FR" dirty="0"/>
           </a:p>
@@ -6506,6 +6572,18 @@
   <p:clrMapOvr>
     <a:masterClrMapping/>
   </p:clrMapOvr>
+  <mc:AlternateContent xmlns:mc="http://schemas.openxmlformats.org/markup-compatibility/2006">
+    <mc:Choice xmlns:p14="http://schemas.microsoft.com/office/powerpoint/2010/main" Requires="p14">
+      <p:transition spd="slow" p14:dur="1200">
+        <p14:prism dir="u"/>
+      </p:transition>
+    </mc:Choice>
+    <mc:Fallback>
+      <p:transition spd="slow">
+        <p:fade/>
+      </p:transition>
+    </mc:Fallback>
+  </mc:AlternateContent>
 </p:sldLayout>
 </file>
 
@@ -6544,7 +6622,7 @@
             <a:pPr rtl="0"/>
             <a:fld id="{C6837A1F-B66B-4228-AEB2-61CF9440ED2A}" type="datetime1">
               <a:rPr lang="fr-FR" smtClean="0"/>
-              <a:t>14/01/2019</a:t>
+              <a:t>16/01/2019</a:t>
             </a:fld>
             <a:endParaRPr lang="fr-FR" dirty="0"/>
           </a:p>
@@ -6603,6 +6681,18 @@
   <p:clrMapOvr>
     <a:masterClrMapping/>
   </p:clrMapOvr>
+  <mc:AlternateContent xmlns:mc="http://schemas.openxmlformats.org/markup-compatibility/2006">
+    <mc:Choice xmlns:p14="http://schemas.microsoft.com/office/powerpoint/2010/main" Requires="p14">
+      <p:transition spd="slow" p14:dur="1200">
+        <p14:prism dir="u"/>
+      </p:transition>
+    </mc:Choice>
+    <mc:Fallback>
+      <p:transition spd="slow">
+        <p:fade/>
+      </p:transition>
+    </mc:Fallback>
+  </mc:AlternateContent>
 </p:sldLayout>
 </file>
 
@@ -6827,7 +6917,7 @@
             <a:pPr rtl="0"/>
             <a:fld id="{A8F90262-02CE-43F1-8633-958B47B05D9C}" type="datetime1">
               <a:rPr lang="fr-FR" smtClean="0"/>
-              <a:t>14/01/2019</a:t>
+              <a:t>16/01/2019</a:t>
             </a:fld>
             <a:endParaRPr lang="fr-FR" dirty="0"/>
           </a:p>
@@ -6886,6 +6976,18 @@
   <p:clrMapOvr>
     <a:masterClrMapping/>
   </p:clrMapOvr>
+  <mc:AlternateContent xmlns:mc="http://schemas.openxmlformats.org/markup-compatibility/2006">
+    <mc:Choice xmlns:p14="http://schemas.microsoft.com/office/powerpoint/2010/main" Requires="p14">
+      <p:transition spd="slow" p14:dur="1200">
+        <p14:prism dir="u"/>
+      </p:transition>
+    </mc:Choice>
+    <mc:Fallback>
+      <p:transition spd="slow">
+        <p:fade/>
+      </p:transition>
+    </mc:Fallback>
+  </mc:AlternateContent>
 </p:sldLayout>
 </file>
 
@@ -7107,7 +7209,7 @@
             <a:pPr rtl="0"/>
             <a:fld id="{70425593-8993-415C-BA20-12C4486321AC}" type="datetime1">
               <a:rPr lang="fr-FR" smtClean="0"/>
-              <a:t>14/01/2019</a:t>
+              <a:t>16/01/2019</a:t>
             </a:fld>
             <a:endParaRPr lang="fr-FR" dirty="0"/>
           </a:p>
@@ -7166,6 +7268,18 @@
   <p:clrMapOvr>
     <a:masterClrMapping/>
   </p:clrMapOvr>
+  <mc:AlternateContent xmlns:mc="http://schemas.openxmlformats.org/markup-compatibility/2006">
+    <mc:Choice xmlns:p14="http://schemas.microsoft.com/office/powerpoint/2010/main" Requires="p14">
+      <p:transition spd="slow" p14:dur="1200">
+        <p14:prism dir="u"/>
+      </p:transition>
+    </mc:Choice>
+    <mc:Fallback>
+      <p:transition spd="slow">
+        <p:fade/>
+      </p:transition>
+    </mc:Fallback>
+  </mc:AlternateContent>
 </p:sldLayout>
 </file>
 
@@ -7510,7 +7624,7 @@
             <a:pPr rtl="0"/>
             <a:fld id="{EC3A1E86-7F8E-4D42-BD72-A0F4BE55585E}" type="datetime1">
               <a:rPr lang="fr-FR" smtClean="0"/>
-              <a:t>14/01/2019</a:t>
+              <a:t>16/01/2019</a:t>
             </a:fld>
             <a:endParaRPr lang="fr-FR" dirty="0"/>
           </a:p>
@@ -7669,6 +7783,18 @@
     <p:sldLayoutId id="2147483658" r:id="rId18"/>
     <p:sldLayoutId id="2147483659" r:id="rId19"/>
   </p:sldLayoutIdLst>
+  <mc:AlternateContent xmlns:mc="http://schemas.openxmlformats.org/markup-compatibility/2006">
+    <mc:Choice xmlns:p14="http://schemas.microsoft.com/office/powerpoint/2010/main" Requires="p14">
+      <p:transition spd="slow" p14:dur="1200">
+        <p14:prism dir="u"/>
+      </p:transition>
+    </mc:Choice>
+    <mc:Fallback>
+      <p:transition spd="slow">
+        <p:fade/>
+      </p:transition>
+    </mc:Fallback>
+  </mc:AlternateContent>
   <p:hf sldNum="0" hdr="0" ftr="0" dt="0"/>
   <p:txStyles>
     <p:titleStyle>
@@ -8134,12 +8260,8 @@
           <a:p>
             <a:pPr algn="ctr" rtl="0"/>
             <a:r>
-              <a:rPr lang="fr-FR" dirty="0" err="1" smtClean="0"/>
-              <a:t>Premiere</a:t>
-            </a:r>
-            <a:r>
               <a:rPr lang="fr-FR" dirty="0" smtClean="0"/>
-              <a:t> revue de projet</a:t>
+              <a:t>Première revue de projet</a:t>
             </a:r>
             <a:endParaRPr lang="fr-FR" dirty="0"/>
           </a:p>
@@ -8151,9 +8273,9 @@
     <a:masterClrMapping/>
   </p:clrMapOvr>
   <mc:AlternateContent xmlns:mc="http://schemas.openxmlformats.org/markup-compatibility/2006">
-    <mc:Choice xmlns:p15="http://schemas.microsoft.com/office/powerpoint/2012/main" Requires="p15">
-      <p:transition xmlns:p14="http://schemas.microsoft.com/office/powerpoint/2010/main" spd="slow" p14:dur="6000">
-        <p15:prstTrans prst="curtains"/>
+    <mc:Choice xmlns:p14="http://schemas.microsoft.com/office/powerpoint/2010/main" Requires="p14">
+      <p:transition spd="slow" p14:dur="1200">
+        <p14:prism dir="u"/>
       </p:transition>
     </mc:Choice>
     <mc:Fallback>
@@ -8191,7 +8313,7 @@
       </p:grpSpPr>
       <p:sp>
         <p:nvSpPr>
-          <p:cNvPr id="2" name="Titre 1"/>
+          <p:cNvPr id="4" name="Titre 3"/>
           <p:cNvSpPr>
             <a:spLocks noGrp="1"/>
           </p:cNvSpPr>
@@ -8206,16 +8328,15 @@
           <a:p>
             <a:pPr rtl="0"/>
             <a:r>
-              <a:rPr lang="fr-FR"/>
-              <a:t>Plan financier</a:t>
-            </a:r>
-            <a:endParaRPr lang="fr-FR" dirty="0"/>
-          </a:p>
-        </p:txBody>
-      </p:sp>
-      <p:sp>
-        <p:nvSpPr>
-          <p:cNvPr id="5" name="Espace réservé du contenu 4"/>
+              <a:rPr lang="fr-FR" dirty="0"/>
+              <a:t>Ressources nécessaires</a:t>
+            </a:r>
+          </a:p>
+        </p:txBody>
+      </p:sp>
+      <p:sp>
+        <p:nvSpPr>
+          <p:cNvPr id="3" name="Espace réservé du contenu 2"/>
           <p:cNvSpPr>
             <a:spLocks noGrp="1"/>
           </p:cNvSpPr>
@@ -8225,25 +8346,71 @@
         </p:nvSpPr>
         <p:spPr/>
         <p:txBody>
-          <a:bodyPr rtlCol="0">
-            <a:normAutofit/>
-          </a:bodyPr>
-          <a:lstStyle/>
-          <a:p>
-            <a:pPr marL="0" indent="0" algn="ctr" rtl="0">
-              <a:buNone/>
-            </a:pPr>
-            <a:endParaRPr lang="fr-FR" sz="9600" dirty="0" smtClean="0"/>
-          </a:p>
-          <a:p>
-            <a:pPr marL="0" indent="0" algn="ctr" rtl="0">
-              <a:buNone/>
-            </a:pPr>
-            <a:r>
-              <a:rPr lang="fr-FR" sz="9600" dirty="0" smtClean="0"/>
-              <a:t>200€</a:t>
-            </a:r>
-            <a:endParaRPr lang="fr-FR" sz="9600" dirty="0"/>
+          <a:bodyPr rtlCol="0"/>
+          <a:lstStyle/>
+          <a:p>
+            <a:pPr rtl="0"/>
+            <a:r>
+              <a:rPr lang="fr-FR" dirty="0" smtClean="0">
+                <a:hlinkClick r:id="rId3" action="ppaction://hlinksldjump"/>
+              </a:rPr>
+              <a:t>Module micro SD</a:t>
+            </a:r>
+            <a:endParaRPr lang="fr-FR" dirty="0" smtClean="0"/>
+          </a:p>
+          <a:p>
+            <a:pPr rtl="0"/>
+            <a:r>
+              <a:rPr lang="fr-FR" dirty="0" smtClean="0">
+                <a:hlinkClick r:id="rId4" action="ppaction://hlinksldjump"/>
+              </a:rPr>
+              <a:t>Buzzer piézoélectrique</a:t>
+            </a:r>
+            <a:endParaRPr lang="fr-FR" dirty="0" smtClean="0"/>
+          </a:p>
+          <a:p>
+            <a:pPr rtl="0"/>
+            <a:r>
+              <a:rPr lang="fr-FR" dirty="0" smtClean="0">
+                <a:hlinkClick r:id="rId5" action="ppaction://hlinksldjump"/>
+              </a:rPr>
+              <a:t>Capteur GPS avec une sortie NMEA</a:t>
+            </a:r>
+            <a:endParaRPr lang="fr-FR" dirty="0" smtClean="0"/>
+          </a:p>
+          <a:p>
+            <a:pPr rtl="0"/>
+            <a:r>
+              <a:rPr lang="fr-FR" dirty="0" smtClean="0">
+                <a:hlinkClick r:id="rId6" action="ppaction://hlinksldjump"/>
+              </a:rPr>
+              <a:t>Tablette avec un OS Android</a:t>
+            </a:r>
+            <a:endParaRPr lang="fr-FR" dirty="0" smtClean="0"/>
+          </a:p>
+          <a:p>
+            <a:pPr rtl="0"/>
+            <a:r>
+              <a:rPr lang="fr-FR" dirty="0" smtClean="0">
+                <a:hlinkClick r:id="rId7" action="ppaction://hlinksldjump"/>
+              </a:rPr>
+              <a:t>Téléphone avec une carte SIM</a:t>
+            </a:r>
+            <a:endParaRPr lang="fr-FR" dirty="0" smtClean="0"/>
+          </a:p>
+          <a:p>
+            <a:pPr rtl="0"/>
+            <a:r>
+              <a:rPr lang="fr-FR" dirty="0" smtClean="0">
+                <a:hlinkClick r:id="rId8" action="ppaction://hlinksldjump"/>
+              </a:rPr>
+              <a:t>Une carte Arduino Nano</a:t>
+            </a:r>
+            <a:endParaRPr lang="fr-FR" dirty="0" smtClean="0"/>
+          </a:p>
+          <a:p>
+            <a:pPr rtl="0"/>
+            <a:endParaRPr lang="fr-FR" dirty="0"/>
           </a:p>
         </p:txBody>
       </p:sp>
@@ -8254,8 +8421,8 @@
   </p:clrMapOvr>
   <mc:AlternateContent xmlns:mc="http://schemas.openxmlformats.org/markup-compatibility/2006">
     <mc:Choice xmlns:p14="http://schemas.microsoft.com/office/powerpoint/2010/main" Requires="p14">
-      <p:transition spd="slow" p14:dur="4400">
-        <p14:honeycomb/>
+      <p:transition spd="slow" p14:dur="1200">
+        <p14:prism dir="u"/>
       </p:transition>
     </mc:Choice>
     <mc:Fallback>
@@ -8333,14 +8500,21 @@
             <a:pPr rtl="0"/>
             <a:r>
               <a:rPr lang="fr-FR" dirty="0" smtClean="0"/>
-              <a:t>Ne pas voler de moto</a:t>
+              <a:t>Récupération de données en temps réel sur l’application mobile</a:t>
             </a:r>
           </a:p>
           <a:p>
             <a:pPr rtl="0"/>
             <a:r>
               <a:rPr lang="fr-FR" dirty="0" smtClean="0"/>
-              <a:t>*ptr1 &gt; projet</a:t>
+              <a:t>En mode alarme, émettre un signal sonore lorsque la moto bouge jusqu’à désactivation par le gérant</a:t>
+            </a:r>
+          </a:p>
+          <a:p>
+            <a:pPr rtl="0"/>
+            <a:r>
+              <a:rPr lang="fr-FR" dirty="0" smtClean="0"/>
+              <a:t>Choisir via l’application mobile le mode que le gérant souhaite utiliser</a:t>
             </a:r>
           </a:p>
           <a:p>
@@ -8355,9 +8529,9 @@
     <a:masterClrMapping/>
   </p:clrMapOvr>
   <mc:AlternateContent xmlns:mc="http://schemas.openxmlformats.org/markup-compatibility/2006">
-    <mc:Choice xmlns:p15="http://schemas.microsoft.com/office/powerpoint/2012/main" Requires="p15">
-      <p:transition xmlns:p14="http://schemas.microsoft.com/office/powerpoint/2010/main" spd="slow" p14:dur="2000">
-        <p15:prstTrans prst="crush"/>
+    <mc:Choice xmlns:p14="http://schemas.microsoft.com/office/powerpoint/2010/main" Requires="p14">
+      <p:transition spd="slow" p14:dur="1200">
+        <p14:prism dir="u"/>
       </p:transition>
     </mc:Choice>
     <mc:Fallback>
@@ -8377,7 +8551,103 @@
 </file>
 
 <file path=ppt/slides/slide12.xml><?xml version="1.0" encoding="utf-8"?>
-<p:sld xmlns:a="http://schemas.openxmlformats.org/drawingml/2006/main" xmlns:r="http://schemas.openxmlformats.org/officeDocument/2006/relationships" xmlns:p="http://schemas.openxmlformats.org/presentationml/2006/main">
+<p:sld xmlns:a="http://schemas.openxmlformats.org/drawingml/2006/main" xmlns:r="http://schemas.openxmlformats.org/officeDocument/2006/relationships" xmlns:p="http://schemas.openxmlformats.org/presentationml/2006/main" showMasterSp="0">
+  <p:cSld>
+    <p:bg>
+      <p:bgPr>
+        <a:solidFill>
+          <a:schemeClr val="bg1">
+            <a:alpha val="98000"/>
+          </a:schemeClr>
+        </a:solidFill>
+        <a:effectLst/>
+      </p:bgPr>
+    </p:bg>
+    <p:spTree>
+      <p:nvGrpSpPr>
+        <p:cNvPr id="1" name=""/>
+        <p:cNvGrpSpPr/>
+        <p:nvPr/>
+      </p:nvGrpSpPr>
+      <p:grpSpPr>
+        <a:xfrm>
+          <a:off x="0" y="0"/>
+          <a:ext cx="0" cy="0"/>
+          <a:chOff x="0" y="0"/>
+          <a:chExt cx="0" cy="0"/>
+        </a:xfrm>
+      </p:grpSpPr>
+      <p:sp>
+        <p:nvSpPr>
+          <p:cNvPr id="3" name="Espace réservé du contenu 2"/>
+          <p:cNvSpPr>
+            <a:spLocks noGrp="1"/>
+          </p:cNvSpPr>
+          <p:nvPr>
+            <p:ph idx="1"/>
+          </p:nvPr>
+        </p:nvSpPr>
+        <p:spPr>
+          <a:xfrm>
+            <a:off x="0" y="1147010"/>
+            <a:ext cx="12192000" cy="6809873"/>
+          </a:xfrm>
+        </p:spPr>
+        <p:txBody>
+          <a:bodyPr>
+            <a:normAutofit/>
+          </a:bodyPr>
+          <a:lstStyle/>
+          <a:p>
+            <a:pPr marL="0" indent="0" algn="ctr">
+              <a:buNone/>
+            </a:pPr>
+            <a:r>
+              <a:rPr lang="fr-FR" sz="30000" dirty="0" smtClean="0">
+                <a:latin typeface="Baskerville Old Face" panose="02020602080505020303" pitchFamily="18" charset="0"/>
+              </a:rPr>
+              <a:t>FIN</a:t>
+            </a:r>
+            <a:endParaRPr lang="fr-FR" sz="30000" dirty="0">
+              <a:latin typeface="Baskerville Old Face" panose="02020602080505020303" pitchFamily="18" charset="0"/>
+            </a:endParaRPr>
+          </a:p>
+        </p:txBody>
+      </p:sp>
+    </p:spTree>
+    <p:extLst>
+      <p:ext uri="{BB962C8B-B14F-4D97-AF65-F5344CB8AC3E}">
+        <p14:creationId xmlns:p14="http://schemas.microsoft.com/office/powerpoint/2010/main" val="2786867261"/>
+      </p:ext>
+    </p:extLst>
+  </p:cSld>
+  <p:clrMapOvr>
+    <a:masterClrMapping/>
+  </p:clrMapOvr>
+  <mc:AlternateContent xmlns:mc="http://schemas.openxmlformats.org/markup-compatibility/2006">
+    <mc:Choice xmlns:p14="http://schemas.microsoft.com/office/powerpoint/2010/main" Requires="p14">
+      <p:transition spd="slow" p14:dur="1200">
+        <p14:prism dir="u"/>
+      </p:transition>
+    </mc:Choice>
+    <mc:Fallback>
+      <p:transition spd="slow">
+        <p:fade/>
+      </p:transition>
+    </mc:Fallback>
+  </mc:AlternateContent>
+  <p:timing>
+    <p:tnLst>
+      <p:par>
+        <p:cTn id="1" dur="indefinite" restart="never" nodeType="tmRoot"/>
+      </p:par>
+    </p:tnLst>
+  </p:timing>
+</p:sld>
+</file>
+
+<file path=ppt/slides/slide13.xml><?xml version="1.0" encoding="utf-8"?>
+<p:sld xmlns:a="http://schemas.openxmlformats.org/drawingml/2006/main" xmlns:r="http://schemas.openxmlformats.org/officeDocument/2006/relationships" xmlns:p="http://schemas.openxmlformats.org/presentationml/2006/main" show="0">
   <p:cSld>
     <p:spTree>
       <p:nvGrpSpPr>
@@ -8405,21 +8675,20 @@
         </p:nvSpPr>
         <p:spPr/>
         <p:txBody>
-          <a:bodyPr rtlCol="0"/>
-          <a:lstStyle/>
-          <a:p>
-            <a:pPr rtl="0"/>
-            <a:r>
-              <a:rPr lang="fr-FR"/>
-              <a:t>Annexes</a:t>
-            </a:r>
-            <a:endParaRPr lang="fr-FR" dirty="0"/>
-          </a:p>
-        </p:txBody>
-      </p:sp>
-      <p:sp>
-        <p:nvSpPr>
-          <p:cNvPr id="3" name="Espace réservé du texte 2"/>
+          <a:bodyPr/>
+          <a:lstStyle/>
+          <a:p>
+            <a:r>
+              <a:rPr lang="fr-FR" dirty="0" smtClean="0"/>
+              <a:t>Duparc Quentin</a:t>
+            </a:r>
+            <a:endParaRPr lang="fr-FR" dirty="0"/>
+          </a:p>
+        </p:txBody>
+      </p:sp>
+      <p:sp>
+        <p:nvSpPr>
+          <p:cNvPr id="3" name="Espace réservé du contenu 2"/>
           <p:cNvSpPr>
             <a:spLocks noGrp="1"/>
           </p:cNvSpPr>
@@ -8429,25 +8698,91 @@
         </p:nvSpPr>
         <p:spPr/>
         <p:txBody>
-          <a:bodyPr rtlCol="0"/>
-          <a:lstStyle/>
-          <a:p>
-            <a:pPr rtl="0"/>
-            <a:r>
-              <a:rPr lang="fr-FR"/>
-              <a:t>Indiquez les références de ressources et documents supplémentaires</a:t>
-            </a:r>
-          </a:p>
-          <a:p>
-            <a:pPr rtl="0"/>
-            <a:endParaRPr lang="fr-FR" dirty="0"/>
+          <a:bodyPr/>
+          <a:lstStyle/>
+          <a:p>
+            <a:endParaRPr lang="fr-FR"/>
+          </a:p>
+        </p:txBody>
+      </p:sp>
+      <p:sp>
+        <p:nvSpPr>
+          <p:cNvPr id="4" name="Flèche droite 3">
+            <a:hlinkClick r:id="rId2" action="ppaction://hlinksldjump"/>
+          </p:cNvPr>
+          <p:cNvSpPr/>
+          <p:nvPr/>
+        </p:nvSpPr>
+        <p:spPr>
+          <a:xfrm rot="10800000">
+            <a:off x="60575" y="6184232"/>
+            <a:ext cx="677362" cy="385010"/>
+          </a:xfrm>
+          <a:prstGeom prst="rightArrow">
+            <a:avLst/>
+          </a:prstGeom>
+        </p:spPr>
+        <p:style>
+          <a:lnRef idx="2">
+            <a:schemeClr val="accent1">
+              <a:shade val="50000"/>
+            </a:schemeClr>
+          </a:lnRef>
+          <a:fillRef idx="1">
+            <a:schemeClr val="accent1"/>
+          </a:fillRef>
+          <a:effectRef idx="0">
+            <a:schemeClr val="accent1"/>
+          </a:effectRef>
+          <a:fontRef idx="minor">
+            <a:schemeClr val="lt1"/>
+          </a:fontRef>
+        </p:style>
+        <p:txBody>
+          <a:bodyPr rtlCol="0" anchor="ctr"/>
+          <a:lstStyle/>
+          <a:p>
+            <a:pPr algn="ctr"/>
+            <a:endParaRPr lang="fr-FR"/>
+          </a:p>
+        </p:txBody>
+      </p:sp>
+      <p:sp>
+        <p:nvSpPr>
+          <p:cNvPr id="5" name="ZoneTexte 4"/>
+          <p:cNvSpPr txBox="1"/>
+          <p:nvPr/>
+        </p:nvSpPr>
+        <p:spPr>
+          <a:xfrm>
+            <a:off x="60574" y="6245932"/>
+            <a:ext cx="677363" cy="261610"/>
+          </a:xfrm>
+          <a:prstGeom prst="rect">
+            <a:avLst/>
+          </a:prstGeom>
+          <a:noFill/>
+        </p:spPr>
+        <p:txBody>
+          <a:bodyPr wrap="square" rtlCol="0">
+            <a:spAutoFit/>
+          </a:bodyPr>
+          <a:lstStyle/>
+          <a:p>
+            <a:r>
+              <a:rPr lang="fr-FR" sz="1100" dirty="0" smtClean="0">
+                <a:hlinkClick r:id="rId2" action="ppaction://hlinksldjump"/>
+              </a:rPr>
+              <a:t>Retour</a:t>
+            </a:r>
+            <a:endParaRPr lang="fr-FR" sz="1100" dirty="0"/>
           </a:p>
         </p:txBody>
       </p:sp>
     </p:spTree>
     <p:extLst>
       <p:ext uri="{BB962C8B-B14F-4D97-AF65-F5344CB8AC3E}">
-        <p14:creationId xmlns:p14="http://schemas.microsoft.com/office/powerpoint/2010/main" val="93470378"/>
+        <p14:creationId xmlns:p14="http://schemas.microsoft.com/office/powerpoint/2010/main" val="1590209037"/>
       </p:ext>
     </p:extLst>
   </p:cSld>
@@ -8456,8 +8791,1130 @@
   </p:clrMapOvr>
   <mc:AlternateContent xmlns:mc="http://schemas.openxmlformats.org/markup-compatibility/2006">
     <mc:Choice xmlns:p14="http://schemas.microsoft.com/office/powerpoint/2010/main" Requires="p14">
-      <p:transition spd="slow" p14:dur="2000">
-        <p14:ferris dir="l"/>
+      <p:transition spd="slow" p14:dur="1200">
+        <p14:prism dir="u"/>
+      </p:transition>
+    </mc:Choice>
+    <mc:Fallback>
+      <p:transition spd="slow">
+        <p:fade/>
+      </p:transition>
+    </mc:Fallback>
+  </mc:AlternateContent>
+  <p:timing>
+    <p:tnLst>
+      <p:par>
+        <p:cTn id="1" dur="indefinite" restart="never" nodeType="tmRoot"/>
+      </p:par>
+    </p:tnLst>
+  </p:timing>
+</p:sld>
+</file>
+
+<file path=ppt/slides/slide14.xml><?xml version="1.0" encoding="utf-8"?>
+<p:sld xmlns:a="http://schemas.openxmlformats.org/drawingml/2006/main" xmlns:r="http://schemas.openxmlformats.org/officeDocument/2006/relationships" xmlns:p="http://schemas.openxmlformats.org/presentationml/2006/main" show="0">
+  <p:cSld>
+    <p:spTree>
+      <p:nvGrpSpPr>
+        <p:cNvPr id="1" name=""/>
+        <p:cNvGrpSpPr/>
+        <p:nvPr/>
+      </p:nvGrpSpPr>
+      <p:grpSpPr>
+        <a:xfrm>
+          <a:off x="0" y="0"/>
+          <a:ext cx="0" cy="0"/>
+          <a:chOff x="0" y="0"/>
+          <a:chExt cx="0" cy="0"/>
+        </a:xfrm>
+      </p:grpSpPr>
+      <p:sp>
+        <p:nvSpPr>
+          <p:cNvPr id="2" name="Titre 1"/>
+          <p:cNvSpPr>
+            <a:spLocks noGrp="1"/>
+          </p:cNvSpPr>
+          <p:nvPr>
+            <p:ph type="title"/>
+          </p:nvPr>
+        </p:nvSpPr>
+        <p:spPr/>
+        <p:txBody>
+          <a:bodyPr/>
+          <a:lstStyle/>
+          <a:p>
+            <a:r>
+              <a:rPr lang="fr-FR" dirty="0" smtClean="0"/>
+              <a:t>Prévéral Duncan</a:t>
+            </a:r>
+            <a:endParaRPr lang="fr-FR" dirty="0"/>
+          </a:p>
+        </p:txBody>
+      </p:sp>
+      <p:pic>
+        <p:nvPicPr>
+          <p:cNvPr id="2054" name="Picture 6" descr="RÃ©sultat de recherche d'images pour &quot;Duncan PrÃ©vÃ©ral&quot;"/>
+          <p:cNvPicPr>
+            <a:picLocks noGrp="1" noChangeAspect="1" noChangeArrowheads="1"/>
+          </p:cNvPicPr>
+          <p:nvPr>
+            <p:ph idx="1"/>
+          </p:nvPr>
+        </p:nvPicPr>
+        <p:blipFill>
+          <a:blip r:embed="rId2">
+            <a:extLst>
+              <a:ext uri="{28A0092B-C50C-407E-A947-70E740481C1C}">
+                <a14:useLocalDpi xmlns:a14="http://schemas.microsoft.com/office/drawing/2010/main" val="0"/>
+              </a:ext>
+            </a:extLst>
+          </a:blip>
+          <a:srcRect/>
+          <a:stretch>
+            <a:fillRect/>
+          </a:stretch>
+        </p:blipFill>
+        <p:spPr bwMode="auto">
+          <a:xfrm>
+            <a:off x="3479007" y="2052638"/>
+            <a:ext cx="4195762" cy="4195762"/>
+          </a:xfrm>
+          <a:prstGeom prst="rect">
+            <a:avLst/>
+          </a:prstGeom>
+          <a:noFill/>
+          <a:extLst>
+            <a:ext uri="{909E8E84-426E-40DD-AFC4-6F175D3DCCD1}">
+              <a14:hiddenFill xmlns:a14="http://schemas.microsoft.com/office/drawing/2010/main">
+                <a:solidFill>
+                  <a:srgbClr val="FFFFFF"/>
+                </a:solidFill>
+              </a14:hiddenFill>
+            </a:ext>
+          </a:extLst>
+        </p:spPr>
+      </p:pic>
+      <p:sp>
+        <p:nvSpPr>
+          <p:cNvPr id="7" name="Flèche droite 6">
+            <a:hlinkClick r:id="rId3" action="ppaction://hlinksldjump"/>
+          </p:cNvPr>
+          <p:cNvSpPr/>
+          <p:nvPr/>
+        </p:nvSpPr>
+        <p:spPr>
+          <a:xfrm rot="10800000">
+            <a:off x="60575" y="6184232"/>
+            <a:ext cx="677362" cy="385010"/>
+          </a:xfrm>
+          <a:prstGeom prst="rightArrow">
+            <a:avLst/>
+          </a:prstGeom>
+        </p:spPr>
+        <p:style>
+          <a:lnRef idx="2">
+            <a:schemeClr val="accent1">
+              <a:shade val="50000"/>
+            </a:schemeClr>
+          </a:lnRef>
+          <a:fillRef idx="1">
+            <a:schemeClr val="accent1"/>
+          </a:fillRef>
+          <a:effectRef idx="0">
+            <a:schemeClr val="accent1"/>
+          </a:effectRef>
+          <a:fontRef idx="minor">
+            <a:schemeClr val="lt1"/>
+          </a:fontRef>
+        </p:style>
+        <p:txBody>
+          <a:bodyPr rtlCol="0" anchor="ctr"/>
+          <a:lstStyle/>
+          <a:p>
+            <a:pPr algn="ctr"/>
+            <a:endParaRPr lang="fr-FR"/>
+          </a:p>
+        </p:txBody>
+      </p:sp>
+      <p:sp>
+        <p:nvSpPr>
+          <p:cNvPr id="8" name="ZoneTexte 7"/>
+          <p:cNvSpPr txBox="1"/>
+          <p:nvPr/>
+        </p:nvSpPr>
+        <p:spPr>
+          <a:xfrm>
+            <a:off x="60574" y="6245932"/>
+            <a:ext cx="894765" cy="261610"/>
+          </a:xfrm>
+          <a:prstGeom prst="rect">
+            <a:avLst/>
+          </a:prstGeom>
+          <a:noFill/>
+        </p:spPr>
+        <p:txBody>
+          <a:bodyPr wrap="square" rtlCol="0">
+            <a:spAutoFit/>
+          </a:bodyPr>
+          <a:lstStyle/>
+          <a:p>
+            <a:r>
+              <a:rPr lang="fr-FR" sz="1100" dirty="0" smtClean="0">
+                <a:hlinkClick r:id="rId3" action="ppaction://hlinksldjump"/>
+              </a:rPr>
+              <a:t>Retour</a:t>
+            </a:r>
+            <a:endParaRPr lang="fr-FR" sz="1100" dirty="0"/>
+          </a:p>
+        </p:txBody>
+      </p:sp>
+    </p:spTree>
+    <p:extLst>
+      <p:ext uri="{BB962C8B-B14F-4D97-AF65-F5344CB8AC3E}">
+        <p14:creationId xmlns:p14="http://schemas.microsoft.com/office/powerpoint/2010/main" val="3721639831"/>
+      </p:ext>
+    </p:extLst>
+  </p:cSld>
+  <p:clrMapOvr>
+    <a:masterClrMapping/>
+  </p:clrMapOvr>
+  <mc:AlternateContent xmlns:mc="http://schemas.openxmlformats.org/markup-compatibility/2006">
+    <mc:Choice xmlns:p14="http://schemas.microsoft.com/office/powerpoint/2010/main" Requires="p14">
+      <p:transition spd="slow" p14:dur="1200">
+        <p14:prism dir="u"/>
+      </p:transition>
+    </mc:Choice>
+    <mc:Fallback>
+      <p:transition spd="slow">
+        <p:fade/>
+      </p:transition>
+    </mc:Fallback>
+  </mc:AlternateContent>
+  <p:timing>
+    <p:tnLst>
+      <p:par>
+        <p:cTn id="1" dur="indefinite" restart="never" nodeType="tmRoot"/>
+      </p:par>
+    </p:tnLst>
+  </p:timing>
+</p:sld>
+</file>
+
+<file path=ppt/slides/slide15.xml><?xml version="1.0" encoding="utf-8"?>
+<p:sld xmlns:a="http://schemas.openxmlformats.org/drawingml/2006/main" xmlns:r="http://schemas.openxmlformats.org/officeDocument/2006/relationships" xmlns:p="http://schemas.openxmlformats.org/presentationml/2006/main" show="0">
+  <p:cSld>
+    <p:spTree>
+      <p:nvGrpSpPr>
+        <p:cNvPr id="1" name=""/>
+        <p:cNvGrpSpPr/>
+        <p:nvPr/>
+      </p:nvGrpSpPr>
+      <p:grpSpPr>
+        <a:xfrm>
+          <a:off x="0" y="0"/>
+          <a:ext cx="0" cy="0"/>
+          <a:chOff x="0" y="0"/>
+          <a:chExt cx="0" cy="0"/>
+        </a:xfrm>
+      </p:grpSpPr>
+      <p:sp>
+        <p:nvSpPr>
+          <p:cNvPr id="2" name="Titre 1"/>
+          <p:cNvSpPr>
+            <a:spLocks noGrp="1"/>
+          </p:cNvSpPr>
+          <p:nvPr>
+            <p:ph type="title"/>
+          </p:nvPr>
+        </p:nvSpPr>
+        <p:spPr/>
+        <p:txBody>
+          <a:bodyPr/>
+          <a:lstStyle/>
+          <a:p>
+            <a:r>
+              <a:rPr lang="fr-FR" dirty="0" err="1" smtClean="0"/>
+              <a:t>Ferrer-Doriol</a:t>
+            </a:r>
+            <a:r>
+              <a:rPr lang="fr-FR" dirty="0" smtClean="0"/>
+              <a:t> Denis</a:t>
+            </a:r>
+            <a:endParaRPr lang="fr-FR" dirty="0"/>
+          </a:p>
+        </p:txBody>
+      </p:sp>
+      <p:sp>
+        <p:nvSpPr>
+          <p:cNvPr id="3" name="Espace réservé du contenu 2"/>
+          <p:cNvSpPr>
+            <a:spLocks noGrp="1"/>
+          </p:cNvSpPr>
+          <p:nvPr>
+            <p:ph idx="1"/>
+          </p:nvPr>
+        </p:nvSpPr>
+        <p:spPr/>
+        <p:txBody>
+          <a:bodyPr/>
+          <a:lstStyle/>
+          <a:p>
+            <a:endParaRPr lang="fr-FR"/>
+          </a:p>
+        </p:txBody>
+      </p:sp>
+      <p:sp>
+        <p:nvSpPr>
+          <p:cNvPr id="4" name="Flèche droite 3">
+            <a:hlinkClick r:id="rId2" action="ppaction://hlinksldjump"/>
+          </p:cNvPr>
+          <p:cNvSpPr/>
+          <p:nvPr/>
+        </p:nvSpPr>
+        <p:spPr>
+          <a:xfrm rot="10800000">
+            <a:off x="60575" y="6184232"/>
+            <a:ext cx="677362" cy="385010"/>
+          </a:xfrm>
+          <a:prstGeom prst="rightArrow">
+            <a:avLst/>
+          </a:prstGeom>
+        </p:spPr>
+        <p:style>
+          <a:lnRef idx="2">
+            <a:schemeClr val="accent1">
+              <a:shade val="50000"/>
+            </a:schemeClr>
+          </a:lnRef>
+          <a:fillRef idx="1">
+            <a:schemeClr val="accent1"/>
+          </a:fillRef>
+          <a:effectRef idx="0">
+            <a:schemeClr val="accent1"/>
+          </a:effectRef>
+          <a:fontRef idx="minor">
+            <a:schemeClr val="lt1"/>
+          </a:fontRef>
+        </p:style>
+        <p:txBody>
+          <a:bodyPr rtlCol="0" anchor="ctr"/>
+          <a:lstStyle/>
+          <a:p>
+            <a:pPr algn="ctr"/>
+            <a:endParaRPr lang="fr-FR"/>
+          </a:p>
+        </p:txBody>
+      </p:sp>
+      <p:sp>
+        <p:nvSpPr>
+          <p:cNvPr id="5" name="ZoneTexte 4"/>
+          <p:cNvSpPr txBox="1"/>
+          <p:nvPr/>
+        </p:nvSpPr>
+        <p:spPr>
+          <a:xfrm>
+            <a:off x="60574" y="6245932"/>
+            <a:ext cx="894765" cy="261610"/>
+          </a:xfrm>
+          <a:prstGeom prst="rect">
+            <a:avLst/>
+          </a:prstGeom>
+          <a:noFill/>
+        </p:spPr>
+        <p:txBody>
+          <a:bodyPr wrap="square" rtlCol="0">
+            <a:spAutoFit/>
+          </a:bodyPr>
+          <a:lstStyle/>
+          <a:p>
+            <a:r>
+              <a:rPr lang="fr-FR" sz="1100" dirty="0" smtClean="0">
+                <a:hlinkClick r:id="rId2" action="ppaction://hlinksldjump"/>
+              </a:rPr>
+              <a:t>Retour</a:t>
+            </a:r>
+            <a:endParaRPr lang="fr-FR" sz="1100" dirty="0"/>
+          </a:p>
+        </p:txBody>
+      </p:sp>
+    </p:spTree>
+    <p:extLst>
+      <p:ext uri="{BB962C8B-B14F-4D97-AF65-F5344CB8AC3E}">
+        <p14:creationId xmlns:p14="http://schemas.microsoft.com/office/powerpoint/2010/main" val="1925629064"/>
+      </p:ext>
+    </p:extLst>
+  </p:cSld>
+  <p:clrMapOvr>
+    <a:masterClrMapping/>
+  </p:clrMapOvr>
+  <mc:AlternateContent xmlns:mc="http://schemas.openxmlformats.org/markup-compatibility/2006">
+    <mc:Choice xmlns:p14="http://schemas.microsoft.com/office/powerpoint/2010/main" Requires="p14">
+      <p:transition spd="slow" p14:dur="1200">
+        <p14:prism dir="u"/>
+      </p:transition>
+    </mc:Choice>
+    <mc:Fallback>
+      <p:transition spd="slow">
+        <p:fade/>
+      </p:transition>
+    </mc:Fallback>
+  </mc:AlternateContent>
+  <p:timing>
+    <p:tnLst>
+      <p:par>
+        <p:cTn id="1" dur="indefinite" restart="never" nodeType="tmRoot"/>
+      </p:par>
+    </p:tnLst>
+  </p:timing>
+</p:sld>
+</file>
+
+<file path=ppt/slides/slide16.xml><?xml version="1.0" encoding="utf-8"?>
+<p:sld xmlns:a="http://schemas.openxmlformats.org/drawingml/2006/main" xmlns:r="http://schemas.openxmlformats.org/officeDocument/2006/relationships" xmlns:p="http://schemas.openxmlformats.org/presentationml/2006/main" show="0">
+  <p:cSld>
+    <p:spTree>
+      <p:nvGrpSpPr>
+        <p:cNvPr id="1" name=""/>
+        <p:cNvGrpSpPr/>
+        <p:nvPr/>
+      </p:nvGrpSpPr>
+      <p:grpSpPr>
+        <a:xfrm>
+          <a:off x="0" y="0"/>
+          <a:ext cx="0" cy="0"/>
+          <a:chOff x="0" y="0"/>
+          <a:chExt cx="0" cy="0"/>
+        </a:xfrm>
+      </p:grpSpPr>
+      <p:sp>
+        <p:nvSpPr>
+          <p:cNvPr id="2" name="Titre 1"/>
+          <p:cNvSpPr>
+            <a:spLocks noGrp="1"/>
+          </p:cNvSpPr>
+          <p:nvPr>
+            <p:ph type="title"/>
+          </p:nvPr>
+        </p:nvSpPr>
+        <p:spPr/>
+        <p:txBody>
+          <a:bodyPr/>
+          <a:lstStyle/>
+          <a:p>
+            <a:r>
+              <a:rPr lang="fr-FR" dirty="0" smtClean="0"/>
+              <a:t>Module </a:t>
+            </a:r>
+            <a:r>
+              <a:rPr lang="fr-FR" dirty="0" err="1" smtClean="0"/>
+              <a:t>microSD</a:t>
+            </a:r>
+            <a:endParaRPr lang="fr-FR" dirty="0"/>
+          </a:p>
+        </p:txBody>
+      </p:sp>
+      <p:pic>
+        <p:nvPicPr>
+          <p:cNvPr id="4" name="Espace réservé du contenu 3"/>
+          <p:cNvPicPr>
+            <a:picLocks noGrp="1" noChangeAspect="1"/>
+          </p:cNvPicPr>
+          <p:nvPr>
+            <p:ph idx="1"/>
+          </p:nvPr>
+        </p:nvPicPr>
+        <p:blipFill>
+          <a:blip r:embed="rId2">
+            <a:extLst>
+              <a:ext uri="{28A0092B-C50C-407E-A947-70E740481C1C}">
+                <a14:useLocalDpi xmlns:a14="http://schemas.microsoft.com/office/drawing/2010/main" val="0"/>
+              </a:ext>
+            </a:extLst>
+          </a:blip>
+          <a:stretch>
+            <a:fillRect/>
+          </a:stretch>
+        </p:blipFill>
+        <p:spPr>
+          <a:xfrm>
+            <a:off x="2385762" y="2164555"/>
+            <a:ext cx="3367338" cy="3367338"/>
+          </a:xfrm>
+        </p:spPr>
+      </p:pic>
+      <p:pic>
+        <p:nvPicPr>
+          <p:cNvPr id="6" name="Image 5"/>
+          <p:cNvPicPr>
+            <a:picLocks noChangeAspect="1"/>
+          </p:cNvPicPr>
+          <p:nvPr/>
+        </p:nvPicPr>
+        <p:blipFill>
+          <a:blip r:embed="rId3">
+            <a:extLst>
+              <a:ext uri="{28A0092B-C50C-407E-A947-70E740481C1C}">
+                <a14:useLocalDpi xmlns:a14="http://schemas.microsoft.com/office/drawing/2010/main" val="0"/>
+              </a:ext>
+            </a:extLst>
+          </a:blip>
+          <a:stretch>
+            <a:fillRect/>
+          </a:stretch>
+        </p:blipFill>
+        <p:spPr>
+          <a:xfrm>
+            <a:off x="6803607" y="3226592"/>
+            <a:ext cx="2466975" cy="1847850"/>
+          </a:xfrm>
+          <a:prstGeom prst="rect">
+            <a:avLst/>
+          </a:prstGeom>
+        </p:spPr>
+      </p:pic>
+      <p:sp>
+        <p:nvSpPr>
+          <p:cNvPr id="7" name="Flèche droite 6">
+            <a:hlinkClick r:id="rId4" action="ppaction://hlinksldjump"/>
+          </p:cNvPr>
+          <p:cNvSpPr/>
+          <p:nvPr/>
+        </p:nvSpPr>
+        <p:spPr>
+          <a:xfrm rot="10800000">
+            <a:off x="60575" y="6184232"/>
+            <a:ext cx="677362" cy="385010"/>
+          </a:xfrm>
+          <a:prstGeom prst="rightArrow">
+            <a:avLst/>
+          </a:prstGeom>
+        </p:spPr>
+        <p:style>
+          <a:lnRef idx="2">
+            <a:schemeClr val="accent1">
+              <a:shade val="50000"/>
+            </a:schemeClr>
+          </a:lnRef>
+          <a:fillRef idx="1">
+            <a:schemeClr val="accent1"/>
+          </a:fillRef>
+          <a:effectRef idx="0">
+            <a:schemeClr val="accent1"/>
+          </a:effectRef>
+          <a:fontRef idx="minor">
+            <a:schemeClr val="lt1"/>
+          </a:fontRef>
+        </p:style>
+        <p:txBody>
+          <a:bodyPr rtlCol="0" anchor="ctr"/>
+          <a:lstStyle/>
+          <a:p>
+            <a:pPr algn="ctr"/>
+            <a:endParaRPr lang="fr-FR"/>
+          </a:p>
+        </p:txBody>
+      </p:sp>
+      <p:sp>
+        <p:nvSpPr>
+          <p:cNvPr id="8" name="ZoneTexte 7"/>
+          <p:cNvSpPr txBox="1"/>
+          <p:nvPr/>
+        </p:nvSpPr>
+        <p:spPr>
+          <a:xfrm>
+            <a:off x="60574" y="6245932"/>
+            <a:ext cx="894765" cy="261610"/>
+          </a:xfrm>
+          <a:prstGeom prst="rect">
+            <a:avLst/>
+          </a:prstGeom>
+          <a:noFill/>
+        </p:spPr>
+        <p:txBody>
+          <a:bodyPr wrap="square" rtlCol="0">
+            <a:spAutoFit/>
+          </a:bodyPr>
+          <a:lstStyle/>
+          <a:p>
+            <a:r>
+              <a:rPr lang="fr-FR" sz="1100" dirty="0" smtClean="0">
+                <a:hlinkClick r:id="rId4" action="ppaction://hlinksldjump"/>
+              </a:rPr>
+              <a:t>Retour</a:t>
+            </a:r>
+            <a:endParaRPr lang="fr-FR" sz="1100" dirty="0"/>
+          </a:p>
+        </p:txBody>
+      </p:sp>
+    </p:spTree>
+    <p:extLst>
+      <p:ext uri="{BB962C8B-B14F-4D97-AF65-F5344CB8AC3E}">
+        <p14:creationId xmlns:p14="http://schemas.microsoft.com/office/powerpoint/2010/main" val="1910261802"/>
+      </p:ext>
+    </p:extLst>
+  </p:cSld>
+  <p:clrMapOvr>
+    <a:masterClrMapping/>
+  </p:clrMapOvr>
+  <mc:AlternateContent xmlns:mc="http://schemas.openxmlformats.org/markup-compatibility/2006">
+    <mc:Choice xmlns:p14="http://schemas.microsoft.com/office/powerpoint/2010/main" Requires="p14">
+      <p:transition spd="slow" p14:dur="1200">
+        <p14:prism dir="u"/>
+      </p:transition>
+    </mc:Choice>
+    <mc:Fallback>
+      <p:transition spd="slow">
+        <p:fade/>
+      </p:transition>
+    </mc:Fallback>
+  </mc:AlternateContent>
+  <p:timing>
+    <p:tnLst>
+      <p:par>
+        <p:cTn id="1" dur="indefinite" restart="never" nodeType="tmRoot"/>
+      </p:par>
+    </p:tnLst>
+  </p:timing>
+</p:sld>
+</file>
+
+<file path=ppt/slides/slide17.xml><?xml version="1.0" encoding="utf-8"?>
+<p:sld xmlns:a="http://schemas.openxmlformats.org/drawingml/2006/main" xmlns:r="http://schemas.openxmlformats.org/officeDocument/2006/relationships" xmlns:p="http://schemas.openxmlformats.org/presentationml/2006/main" show="0">
+  <p:cSld>
+    <p:spTree>
+      <p:nvGrpSpPr>
+        <p:cNvPr id="1" name=""/>
+        <p:cNvGrpSpPr/>
+        <p:nvPr/>
+      </p:nvGrpSpPr>
+      <p:grpSpPr>
+        <a:xfrm>
+          <a:off x="0" y="0"/>
+          <a:ext cx="0" cy="0"/>
+          <a:chOff x="0" y="0"/>
+          <a:chExt cx="0" cy="0"/>
+        </a:xfrm>
+      </p:grpSpPr>
+      <p:sp>
+        <p:nvSpPr>
+          <p:cNvPr id="2" name="Titre 1"/>
+          <p:cNvSpPr>
+            <a:spLocks noGrp="1"/>
+          </p:cNvSpPr>
+          <p:nvPr>
+            <p:ph type="title"/>
+          </p:nvPr>
+        </p:nvSpPr>
+        <p:spPr/>
+        <p:txBody>
+          <a:bodyPr/>
+          <a:lstStyle/>
+          <a:p>
+            <a:r>
+              <a:rPr lang="fr-FR" dirty="0" err="1" smtClean="0"/>
+              <a:t>Buzzer</a:t>
+            </a:r>
+            <a:r>
+              <a:rPr lang="fr-FR" dirty="0" smtClean="0"/>
+              <a:t> </a:t>
+            </a:r>
+            <a:r>
+              <a:rPr lang="fr-FR" dirty="0" err="1" smtClean="0"/>
+              <a:t>piezzoelctrique</a:t>
+            </a:r>
+            <a:endParaRPr lang="fr-FR" dirty="0"/>
+          </a:p>
+        </p:txBody>
+      </p:sp>
+      <p:pic>
+        <p:nvPicPr>
+          <p:cNvPr id="4" name="Espace réservé du contenu 3"/>
+          <p:cNvPicPr>
+            <a:picLocks noGrp="1" noChangeAspect="1"/>
+          </p:cNvPicPr>
+          <p:nvPr>
+            <p:ph idx="1"/>
+          </p:nvPr>
+        </p:nvPicPr>
+        <p:blipFill>
+          <a:blip r:embed="rId2">
+            <a:extLst>
+              <a:ext uri="{28A0092B-C50C-407E-A947-70E740481C1C}">
+                <a14:useLocalDpi xmlns:a14="http://schemas.microsoft.com/office/drawing/2010/main" val="0"/>
+              </a:ext>
+            </a:extLst>
+          </a:blip>
+          <a:stretch>
+            <a:fillRect/>
+          </a:stretch>
+        </p:blipFill>
+        <p:spPr>
+          <a:xfrm>
+            <a:off x="3989388" y="2563019"/>
+            <a:ext cx="3175000" cy="3175000"/>
+          </a:xfrm>
+        </p:spPr>
+      </p:pic>
+      <p:sp>
+        <p:nvSpPr>
+          <p:cNvPr id="5" name="Flèche droite 4">
+            <a:hlinkClick r:id="rId3" action="ppaction://hlinksldjump"/>
+          </p:cNvPr>
+          <p:cNvSpPr/>
+          <p:nvPr/>
+        </p:nvSpPr>
+        <p:spPr>
+          <a:xfrm rot="10800000">
+            <a:off x="60575" y="6184232"/>
+            <a:ext cx="677362" cy="385010"/>
+          </a:xfrm>
+          <a:prstGeom prst="rightArrow">
+            <a:avLst/>
+          </a:prstGeom>
+        </p:spPr>
+        <p:style>
+          <a:lnRef idx="2">
+            <a:schemeClr val="accent1">
+              <a:shade val="50000"/>
+            </a:schemeClr>
+          </a:lnRef>
+          <a:fillRef idx="1">
+            <a:schemeClr val="accent1"/>
+          </a:fillRef>
+          <a:effectRef idx="0">
+            <a:schemeClr val="accent1"/>
+          </a:effectRef>
+          <a:fontRef idx="minor">
+            <a:schemeClr val="lt1"/>
+          </a:fontRef>
+        </p:style>
+        <p:txBody>
+          <a:bodyPr rtlCol="0" anchor="ctr"/>
+          <a:lstStyle/>
+          <a:p>
+            <a:pPr algn="ctr"/>
+            <a:endParaRPr lang="fr-FR"/>
+          </a:p>
+        </p:txBody>
+      </p:sp>
+      <p:sp>
+        <p:nvSpPr>
+          <p:cNvPr id="6" name="ZoneTexte 5"/>
+          <p:cNvSpPr txBox="1"/>
+          <p:nvPr/>
+        </p:nvSpPr>
+        <p:spPr>
+          <a:xfrm>
+            <a:off x="60574" y="6245932"/>
+            <a:ext cx="894765" cy="261610"/>
+          </a:xfrm>
+          <a:prstGeom prst="rect">
+            <a:avLst/>
+          </a:prstGeom>
+          <a:noFill/>
+        </p:spPr>
+        <p:txBody>
+          <a:bodyPr wrap="square" rtlCol="0">
+            <a:spAutoFit/>
+          </a:bodyPr>
+          <a:lstStyle/>
+          <a:p>
+            <a:r>
+              <a:rPr lang="fr-FR" sz="1100" dirty="0" smtClean="0">
+                <a:hlinkClick r:id="rId3" action="ppaction://hlinksldjump"/>
+              </a:rPr>
+              <a:t>Retour</a:t>
+            </a:r>
+            <a:endParaRPr lang="fr-FR" sz="1100" dirty="0"/>
+          </a:p>
+        </p:txBody>
+      </p:sp>
+    </p:spTree>
+    <p:extLst>
+      <p:ext uri="{BB962C8B-B14F-4D97-AF65-F5344CB8AC3E}">
+        <p14:creationId xmlns:p14="http://schemas.microsoft.com/office/powerpoint/2010/main" val="1256729458"/>
+      </p:ext>
+    </p:extLst>
+  </p:cSld>
+  <p:clrMapOvr>
+    <a:masterClrMapping/>
+  </p:clrMapOvr>
+  <mc:AlternateContent xmlns:mc="http://schemas.openxmlformats.org/markup-compatibility/2006">
+    <mc:Choice xmlns:p14="http://schemas.microsoft.com/office/powerpoint/2010/main" Requires="p14">
+      <p:transition spd="slow" p14:dur="1200">
+        <p14:prism dir="u"/>
+      </p:transition>
+    </mc:Choice>
+    <mc:Fallback>
+      <p:transition spd="slow">
+        <p:fade/>
+      </p:transition>
+    </mc:Fallback>
+  </mc:AlternateContent>
+  <p:timing>
+    <p:tnLst>
+      <p:par>
+        <p:cTn id="1" dur="indefinite" restart="never" nodeType="tmRoot"/>
+      </p:par>
+    </p:tnLst>
+  </p:timing>
+</p:sld>
+</file>
+
+<file path=ppt/slides/slide18.xml><?xml version="1.0" encoding="utf-8"?>
+<p:sld xmlns:a="http://schemas.openxmlformats.org/drawingml/2006/main" xmlns:r="http://schemas.openxmlformats.org/officeDocument/2006/relationships" xmlns:p="http://schemas.openxmlformats.org/presentationml/2006/main" show="0">
+  <p:cSld>
+    <p:spTree>
+      <p:nvGrpSpPr>
+        <p:cNvPr id="1" name=""/>
+        <p:cNvGrpSpPr/>
+        <p:nvPr/>
+      </p:nvGrpSpPr>
+      <p:grpSpPr>
+        <a:xfrm>
+          <a:off x="0" y="0"/>
+          <a:ext cx="0" cy="0"/>
+          <a:chOff x="0" y="0"/>
+          <a:chExt cx="0" cy="0"/>
+        </a:xfrm>
+      </p:grpSpPr>
+      <p:sp>
+        <p:nvSpPr>
+          <p:cNvPr id="2" name="Titre 1"/>
+          <p:cNvSpPr>
+            <a:spLocks noGrp="1"/>
+          </p:cNvSpPr>
+          <p:nvPr>
+            <p:ph type="title"/>
+          </p:nvPr>
+        </p:nvSpPr>
+        <p:spPr/>
+        <p:txBody>
+          <a:bodyPr/>
+          <a:lstStyle/>
+          <a:p>
+            <a:r>
+              <a:rPr lang="fr-FR" dirty="0" smtClean="0"/>
+              <a:t>Module GPS</a:t>
+            </a:r>
+            <a:endParaRPr lang="fr-FR" dirty="0"/>
+          </a:p>
+        </p:txBody>
+      </p:sp>
+      <p:pic>
+        <p:nvPicPr>
+          <p:cNvPr id="4" name="Espace réservé du contenu 3"/>
+          <p:cNvPicPr>
+            <a:picLocks noGrp="1" noChangeAspect="1"/>
+          </p:cNvPicPr>
+          <p:nvPr>
+            <p:ph idx="1"/>
+          </p:nvPr>
+        </p:nvPicPr>
+        <p:blipFill>
+          <a:blip r:embed="rId2">
+            <a:extLst>
+              <a:ext uri="{28A0092B-C50C-407E-A947-70E740481C1C}">
+                <a14:useLocalDpi xmlns:a14="http://schemas.microsoft.com/office/drawing/2010/main" val="0"/>
+              </a:ext>
+            </a:extLst>
+          </a:blip>
+          <a:stretch>
+            <a:fillRect/>
+          </a:stretch>
+        </p:blipFill>
+        <p:spPr>
+          <a:xfrm>
+            <a:off x="3479007" y="2052638"/>
+            <a:ext cx="4195762" cy="4195762"/>
+          </a:xfrm>
+        </p:spPr>
+      </p:pic>
+      <p:sp>
+        <p:nvSpPr>
+          <p:cNvPr id="5" name="Flèche droite 4">
+            <a:hlinkClick r:id="rId3" action="ppaction://hlinksldjump"/>
+          </p:cNvPr>
+          <p:cNvSpPr/>
+          <p:nvPr/>
+        </p:nvSpPr>
+        <p:spPr>
+          <a:xfrm rot="10800000">
+            <a:off x="60575" y="6184232"/>
+            <a:ext cx="677362" cy="385010"/>
+          </a:xfrm>
+          <a:prstGeom prst="rightArrow">
+            <a:avLst/>
+          </a:prstGeom>
+        </p:spPr>
+        <p:style>
+          <a:lnRef idx="2">
+            <a:schemeClr val="accent1">
+              <a:shade val="50000"/>
+            </a:schemeClr>
+          </a:lnRef>
+          <a:fillRef idx="1">
+            <a:schemeClr val="accent1"/>
+          </a:fillRef>
+          <a:effectRef idx="0">
+            <a:schemeClr val="accent1"/>
+          </a:effectRef>
+          <a:fontRef idx="minor">
+            <a:schemeClr val="lt1"/>
+          </a:fontRef>
+        </p:style>
+        <p:txBody>
+          <a:bodyPr rtlCol="0" anchor="ctr"/>
+          <a:lstStyle/>
+          <a:p>
+            <a:pPr algn="ctr"/>
+            <a:endParaRPr lang="fr-FR"/>
+          </a:p>
+        </p:txBody>
+      </p:sp>
+      <p:sp>
+        <p:nvSpPr>
+          <p:cNvPr id="6" name="ZoneTexte 5"/>
+          <p:cNvSpPr txBox="1"/>
+          <p:nvPr/>
+        </p:nvSpPr>
+        <p:spPr>
+          <a:xfrm>
+            <a:off x="60574" y="6245932"/>
+            <a:ext cx="894765" cy="261610"/>
+          </a:xfrm>
+          <a:prstGeom prst="rect">
+            <a:avLst/>
+          </a:prstGeom>
+          <a:noFill/>
+        </p:spPr>
+        <p:txBody>
+          <a:bodyPr wrap="square" rtlCol="0">
+            <a:spAutoFit/>
+          </a:bodyPr>
+          <a:lstStyle/>
+          <a:p>
+            <a:r>
+              <a:rPr lang="fr-FR" sz="1100" dirty="0" smtClean="0">
+                <a:hlinkClick r:id="rId3" action="ppaction://hlinksldjump"/>
+              </a:rPr>
+              <a:t>Retour</a:t>
+            </a:r>
+            <a:endParaRPr lang="fr-FR" sz="1100" dirty="0"/>
+          </a:p>
+        </p:txBody>
+      </p:sp>
+    </p:spTree>
+    <p:extLst>
+      <p:ext uri="{BB962C8B-B14F-4D97-AF65-F5344CB8AC3E}">
+        <p14:creationId xmlns:p14="http://schemas.microsoft.com/office/powerpoint/2010/main" val="159391767"/>
+      </p:ext>
+    </p:extLst>
+  </p:cSld>
+  <p:clrMapOvr>
+    <a:masterClrMapping/>
+  </p:clrMapOvr>
+  <mc:AlternateContent xmlns:mc="http://schemas.openxmlformats.org/markup-compatibility/2006">
+    <mc:Choice xmlns:p14="http://schemas.microsoft.com/office/powerpoint/2010/main" Requires="p14">
+      <p:transition spd="slow" p14:dur="1200">
+        <p14:prism dir="u"/>
+      </p:transition>
+    </mc:Choice>
+    <mc:Fallback>
+      <p:transition spd="slow">
+        <p:fade/>
+      </p:transition>
+    </mc:Fallback>
+  </mc:AlternateContent>
+  <p:timing>
+    <p:tnLst>
+      <p:par>
+        <p:cTn id="1" dur="indefinite" restart="never" nodeType="tmRoot"/>
+      </p:par>
+    </p:tnLst>
+  </p:timing>
+</p:sld>
+</file>
+
+<file path=ppt/slides/slide19.xml><?xml version="1.0" encoding="utf-8"?>
+<p:sld xmlns:a="http://schemas.openxmlformats.org/drawingml/2006/main" xmlns:r="http://schemas.openxmlformats.org/officeDocument/2006/relationships" xmlns:p="http://schemas.openxmlformats.org/presentationml/2006/main" show="0">
+  <p:cSld>
+    <p:spTree>
+      <p:nvGrpSpPr>
+        <p:cNvPr id="1" name=""/>
+        <p:cNvGrpSpPr/>
+        <p:nvPr/>
+      </p:nvGrpSpPr>
+      <p:grpSpPr>
+        <a:xfrm>
+          <a:off x="0" y="0"/>
+          <a:ext cx="0" cy="0"/>
+          <a:chOff x="0" y="0"/>
+          <a:chExt cx="0" cy="0"/>
+        </a:xfrm>
+      </p:grpSpPr>
+      <p:sp>
+        <p:nvSpPr>
+          <p:cNvPr id="2" name="Titre 1"/>
+          <p:cNvSpPr>
+            <a:spLocks noGrp="1"/>
+          </p:cNvSpPr>
+          <p:nvPr>
+            <p:ph type="title"/>
+          </p:nvPr>
+        </p:nvSpPr>
+        <p:spPr/>
+        <p:txBody>
+          <a:bodyPr/>
+          <a:lstStyle/>
+          <a:p>
+            <a:r>
+              <a:rPr lang="fr-FR" dirty="0" smtClean="0"/>
+              <a:t>Tablette </a:t>
+            </a:r>
+            <a:r>
+              <a:rPr lang="fr-FR" dirty="0"/>
+              <a:t>A</a:t>
+            </a:r>
+            <a:r>
+              <a:rPr lang="fr-FR" dirty="0" smtClean="0"/>
+              <a:t>ndroid</a:t>
+            </a:r>
+            <a:endParaRPr lang="fr-FR" dirty="0"/>
+          </a:p>
+        </p:txBody>
+      </p:sp>
+      <p:pic>
+        <p:nvPicPr>
+          <p:cNvPr id="1026" name="Picture 2" descr="RÃ©sultat de recherche d'images pour &quot;tablette Android&quot;"/>
+          <p:cNvPicPr>
+            <a:picLocks noGrp="1" noChangeAspect="1" noChangeArrowheads="1"/>
+          </p:cNvPicPr>
+          <p:nvPr>
+            <p:ph idx="1"/>
+          </p:nvPr>
+        </p:nvPicPr>
+        <p:blipFill>
+          <a:blip r:embed="rId2">
+            <a:extLst>
+              <a:ext uri="{28A0092B-C50C-407E-A947-70E740481C1C}">
+                <a14:useLocalDpi xmlns:a14="http://schemas.microsoft.com/office/drawing/2010/main" val="0"/>
+              </a:ext>
+            </a:extLst>
+          </a:blip>
+          <a:srcRect/>
+          <a:stretch>
+            <a:fillRect/>
+          </a:stretch>
+        </p:blipFill>
+        <p:spPr bwMode="auto">
+          <a:xfrm>
+            <a:off x="3132755" y="2052638"/>
+            <a:ext cx="4888266" cy="4195762"/>
+          </a:xfrm>
+          <a:prstGeom prst="rect">
+            <a:avLst/>
+          </a:prstGeom>
+          <a:noFill/>
+          <a:extLst>
+            <a:ext uri="{909E8E84-426E-40DD-AFC4-6F175D3DCCD1}">
+              <a14:hiddenFill xmlns:a14="http://schemas.microsoft.com/office/drawing/2010/main">
+                <a:solidFill>
+                  <a:srgbClr val="FFFFFF"/>
+                </a:solidFill>
+              </a14:hiddenFill>
+            </a:ext>
+          </a:extLst>
+        </p:spPr>
+      </p:pic>
+      <p:sp>
+        <p:nvSpPr>
+          <p:cNvPr id="9" name="Flèche droite 8">
+            <a:hlinkClick r:id="rId3" action="ppaction://hlinksldjump"/>
+          </p:cNvPr>
+          <p:cNvSpPr/>
+          <p:nvPr/>
+        </p:nvSpPr>
+        <p:spPr>
+          <a:xfrm rot="10800000">
+            <a:off x="60575" y="6184232"/>
+            <a:ext cx="677362" cy="385010"/>
+          </a:xfrm>
+          <a:prstGeom prst="rightArrow">
+            <a:avLst/>
+          </a:prstGeom>
+        </p:spPr>
+        <p:style>
+          <a:lnRef idx="2">
+            <a:schemeClr val="accent1">
+              <a:shade val="50000"/>
+            </a:schemeClr>
+          </a:lnRef>
+          <a:fillRef idx="1">
+            <a:schemeClr val="accent1"/>
+          </a:fillRef>
+          <a:effectRef idx="0">
+            <a:schemeClr val="accent1"/>
+          </a:effectRef>
+          <a:fontRef idx="minor">
+            <a:schemeClr val="lt1"/>
+          </a:fontRef>
+        </p:style>
+        <p:txBody>
+          <a:bodyPr rtlCol="0" anchor="ctr"/>
+          <a:lstStyle/>
+          <a:p>
+            <a:pPr algn="ctr"/>
+            <a:endParaRPr lang="fr-FR"/>
+          </a:p>
+        </p:txBody>
+      </p:sp>
+      <p:sp>
+        <p:nvSpPr>
+          <p:cNvPr id="10" name="ZoneTexte 9"/>
+          <p:cNvSpPr txBox="1"/>
+          <p:nvPr/>
+        </p:nvSpPr>
+        <p:spPr>
+          <a:xfrm>
+            <a:off x="60574" y="6245932"/>
+            <a:ext cx="894765" cy="261610"/>
+          </a:xfrm>
+          <a:prstGeom prst="rect">
+            <a:avLst/>
+          </a:prstGeom>
+          <a:noFill/>
+        </p:spPr>
+        <p:txBody>
+          <a:bodyPr wrap="square" rtlCol="0">
+            <a:spAutoFit/>
+          </a:bodyPr>
+          <a:lstStyle/>
+          <a:p>
+            <a:r>
+              <a:rPr lang="fr-FR" sz="1100" dirty="0" smtClean="0">
+                <a:hlinkClick r:id="rId3" action="ppaction://hlinksldjump"/>
+              </a:rPr>
+              <a:t>Retour</a:t>
+            </a:r>
+            <a:endParaRPr lang="fr-FR" sz="1100" dirty="0"/>
+          </a:p>
+        </p:txBody>
+      </p:sp>
+    </p:spTree>
+    <p:extLst>
+      <p:ext uri="{BB962C8B-B14F-4D97-AF65-F5344CB8AC3E}">
+        <p14:creationId xmlns:p14="http://schemas.microsoft.com/office/powerpoint/2010/main" val="338217077"/>
+      </p:ext>
+    </p:extLst>
+  </p:cSld>
+  <p:clrMapOvr>
+    <a:masterClrMapping/>
+  </p:clrMapOvr>
+  <mc:AlternateContent xmlns:mc="http://schemas.openxmlformats.org/markup-compatibility/2006">
+    <mc:Choice xmlns:p14="http://schemas.microsoft.com/office/powerpoint/2010/main" Requires="p14">
+      <p:transition spd="slow" p14:dur="1200">
+        <p14:prism dir="u"/>
       </p:transition>
     </mc:Choice>
     <mc:Fallback>
@@ -8529,44 +9986,63 @@
         </p:nvSpPr>
         <p:spPr/>
         <p:txBody>
-          <a:bodyPr rtlCol="0"/>
+          <a:bodyPr rtlCol="0">
+            <a:normAutofit fontScale="85000" lnSpcReduction="20000"/>
+          </a:bodyPr>
           <a:lstStyle/>
           <a:p>
             <a:pPr rtl="0"/>
             <a:endParaRPr lang="fr-FR" sz="2400" dirty="0" smtClean="0"/>
           </a:p>
           <a:p>
-            <a:pPr rtl="0"/>
-            <a:r>
-              <a:rPr lang="fr-FR" sz="2400" dirty="0" smtClean="0"/>
-              <a:t>Objectifs :</a:t>
-            </a:r>
-          </a:p>
-          <a:p>
             <a:pPr lvl="1"/>
             <a:r>
-              <a:rPr lang="fr-FR" sz="2400" dirty="0" smtClean="0"/>
+              <a:rPr lang="fr-FR" sz="2200" dirty="0" smtClean="0">
+                <a:hlinkClick r:id="rId3" action="ppaction://hlinksldjump"/>
+              </a:rPr>
+              <a:t>Objectifs</a:t>
+            </a:r>
+            <a:r>
+              <a:rPr lang="fr-FR" sz="2200" dirty="0" smtClean="0"/>
+              <a:t> </a:t>
+            </a:r>
+          </a:p>
+          <a:p>
+            <a:pPr lvl="1"/>
+            <a:r>
+              <a:rPr lang="fr-FR" sz="2400" dirty="0" smtClean="0">
+                <a:hlinkClick r:id="rId4" action="ppaction://hlinksldjump"/>
+              </a:rPr>
               <a:t>Diagramme des cas d’utilisations</a:t>
             </a:r>
+            <a:endParaRPr lang="fr-FR" sz="2400" dirty="0" smtClean="0"/>
           </a:p>
           <a:p>
             <a:pPr lvl="1"/>
             <a:r>
-              <a:rPr lang="fr-FR" sz="2400" dirty="0" smtClean="0"/>
+              <a:rPr lang="fr-FR" sz="2400" dirty="0" smtClean="0">
+                <a:hlinkClick r:id="rId5" action="ppaction://hlinksldjump"/>
+              </a:rPr>
               <a:t>Diagramme de séquence</a:t>
             </a:r>
+            <a:endParaRPr lang="fr-FR" sz="2400" dirty="0" smtClean="0"/>
           </a:p>
           <a:p>
             <a:pPr lvl="2"/>
             <a:r>
-              <a:rPr lang="fr-FR" sz="2200" dirty="0" smtClean="0"/>
+              <a:rPr lang="fr-FR" sz="2200" dirty="0" smtClean="0">
+                <a:hlinkClick r:id="rId5" action="ppaction://hlinksldjump"/>
+              </a:rPr>
               <a:t>Séquence « Trajet »</a:t>
             </a:r>
+            <a:endParaRPr lang="fr-FR" sz="2200" dirty="0" smtClean="0"/>
           </a:p>
           <a:p>
             <a:pPr lvl="2"/>
             <a:r>
-              <a:rPr lang="fr-FR" sz="2200" dirty="0" smtClean="0"/>
+              <a:rPr lang="fr-FR" sz="2200" dirty="0" smtClean="0">
+                <a:hlinkClick r:id="rId6" action="ppaction://hlinksldjump"/>
+              </a:rPr>
               <a:t>Séquence « Alarme »</a:t>
             </a:r>
             <a:endParaRPr lang="fr-FR" sz="2200" dirty="0" smtClean="0"/>
@@ -8574,17 +10050,65 @@
           <a:p>
             <a:pPr lvl="1"/>
             <a:r>
-              <a:rPr lang="fr-FR" sz="2400" dirty="0" smtClean="0"/>
-              <a:t>Diagramme d’</a:t>
-            </a:r>
-            <a:r>
-              <a:rPr lang="fr-FR" sz="2400" dirty="0"/>
-              <a:t>e</a:t>
-            </a:r>
-            <a:r>
-              <a:rPr lang="fr-FR" sz="2400" dirty="0" smtClean="0"/>
-              <a:t>xigences</a:t>
-            </a:r>
+              <a:rPr lang="fr-FR" sz="2400" dirty="0" smtClean="0">
+                <a:hlinkClick r:id="rId7" action="ppaction://hlinksldjump"/>
+              </a:rPr>
+              <a:t>Diagramme </a:t>
+            </a:r>
+            <a:r>
+              <a:rPr lang="fr-FR" sz="2400" dirty="0" smtClean="0">
+                <a:hlinkClick r:id="rId7" action="ppaction://hlinksldjump"/>
+              </a:rPr>
+              <a:t>d’exigences</a:t>
+            </a:r>
+            <a:endParaRPr lang="fr-FR" sz="2400" dirty="0" smtClean="0"/>
+          </a:p>
+          <a:p>
+            <a:pPr lvl="1"/>
+            <a:r>
+              <a:rPr lang="fr-FR" sz="2400" dirty="0" smtClean="0">
+                <a:hlinkClick r:id="rId7" action="ppaction://hlinksldjump"/>
+              </a:rPr>
+              <a:t>Diagramme de block</a:t>
+            </a:r>
+            <a:endParaRPr lang="fr-FR" sz="2400" dirty="0" smtClean="0"/>
+          </a:p>
+          <a:p>
+            <a:pPr lvl="1"/>
+            <a:r>
+              <a:rPr lang="fr-FR" sz="2400" dirty="0" smtClean="0">
+                <a:hlinkClick r:id="rId8" action="ppaction://hlinksldjump"/>
+              </a:rPr>
+              <a:t>L’équipe</a:t>
+            </a:r>
+            <a:endParaRPr lang="fr-FR" sz="2400" dirty="0" smtClean="0"/>
+          </a:p>
+          <a:p>
+            <a:pPr lvl="1"/>
+            <a:r>
+              <a:rPr lang="fr-FR" sz="2400" dirty="0" smtClean="0">
+                <a:hlinkClick r:id="rId9" action="ppaction://hlinksldjump"/>
+              </a:rPr>
+              <a:t>Ressource nécessaire</a:t>
+            </a:r>
+            <a:endParaRPr lang="fr-FR" sz="2400" dirty="0" smtClean="0"/>
+          </a:p>
+          <a:p>
+            <a:pPr lvl="1"/>
+            <a:r>
+              <a:rPr lang="fr-FR" sz="2400" dirty="0" smtClean="0">
+                <a:hlinkClick r:id="rId10" action="ppaction://hlinksldjump"/>
+              </a:rPr>
+              <a:t>Amélioration possible</a:t>
+            </a:r>
+            <a:endParaRPr lang="fr-FR" sz="2400" dirty="0" smtClean="0"/>
+          </a:p>
+          <a:p>
+            <a:pPr lvl="1"/>
+            <a:endParaRPr lang="fr-FR" sz="2400" dirty="0" smtClean="0"/>
+          </a:p>
+          <a:p>
+            <a:pPr lvl="1"/>
             <a:endParaRPr lang="fr-FR" sz="2400" dirty="0"/>
           </a:p>
         </p:txBody>
@@ -8595,9 +10119,361 @@
     <a:masterClrMapping/>
   </p:clrMapOvr>
   <mc:AlternateContent xmlns:mc="http://schemas.openxmlformats.org/markup-compatibility/2006">
-    <mc:Choice xmlns:p15="http://schemas.microsoft.com/office/powerpoint/2012/main" Requires="p15">
-      <p:transition xmlns:p14="http://schemas.microsoft.com/office/powerpoint/2010/main" spd="slow" p14:dur="2000">
-        <p15:prstTrans prst="drape"/>
+    <mc:Choice xmlns:p14="http://schemas.microsoft.com/office/powerpoint/2010/main" Requires="p14">
+      <p:transition spd="slow" p14:dur="1200">
+        <p14:prism dir="u"/>
+      </p:transition>
+    </mc:Choice>
+    <mc:Fallback>
+      <p:transition spd="slow">
+        <p:fade/>
+      </p:transition>
+    </mc:Fallback>
+  </mc:AlternateContent>
+  <p:timing>
+    <p:tnLst>
+      <p:par>
+        <p:cTn id="1" dur="indefinite" restart="never" nodeType="tmRoot"/>
+      </p:par>
+    </p:tnLst>
+  </p:timing>
+</p:sld>
+</file>
+
+<file path=ppt/slides/slide20.xml><?xml version="1.0" encoding="utf-8"?>
+<p:sld xmlns:a="http://schemas.openxmlformats.org/drawingml/2006/main" xmlns:r="http://schemas.openxmlformats.org/officeDocument/2006/relationships" xmlns:p="http://schemas.openxmlformats.org/presentationml/2006/main" show="0">
+  <p:cSld>
+    <p:spTree>
+      <p:nvGrpSpPr>
+        <p:cNvPr id="1" name=""/>
+        <p:cNvGrpSpPr/>
+        <p:nvPr/>
+      </p:nvGrpSpPr>
+      <p:grpSpPr>
+        <a:xfrm>
+          <a:off x="0" y="0"/>
+          <a:ext cx="0" cy="0"/>
+          <a:chOff x="0" y="0"/>
+          <a:chExt cx="0" cy="0"/>
+        </a:xfrm>
+      </p:grpSpPr>
+      <p:sp>
+        <p:nvSpPr>
+          <p:cNvPr id="2" name="Titre 1"/>
+          <p:cNvSpPr>
+            <a:spLocks noGrp="1"/>
+          </p:cNvSpPr>
+          <p:nvPr>
+            <p:ph type="title"/>
+          </p:nvPr>
+        </p:nvSpPr>
+        <p:spPr/>
+        <p:txBody>
+          <a:bodyPr/>
+          <a:lstStyle/>
+          <a:p>
+            <a:r>
+              <a:rPr lang="fr-FR" dirty="0" smtClean="0"/>
+              <a:t>Téléphone mobile avec une carte SIM</a:t>
+            </a:r>
+            <a:endParaRPr lang="fr-FR" dirty="0"/>
+          </a:p>
+        </p:txBody>
+      </p:sp>
+      <p:pic>
+        <p:nvPicPr>
+          <p:cNvPr id="6" name="Espace réservé du contenu 5"/>
+          <p:cNvPicPr>
+            <a:picLocks noGrp="1" noChangeAspect="1"/>
+          </p:cNvPicPr>
+          <p:nvPr>
+            <p:ph idx="1"/>
+          </p:nvPr>
+        </p:nvPicPr>
+        <p:blipFill>
+          <a:blip r:embed="rId2">
+            <a:extLst>
+              <a:ext uri="{28A0092B-C50C-407E-A947-70E740481C1C}">
+                <a14:useLocalDpi xmlns:a14="http://schemas.microsoft.com/office/drawing/2010/main" val="0"/>
+              </a:ext>
+            </a:extLst>
+          </a:blip>
+          <a:stretch>
+            <a:fillRect/>
+          </a:stretch>
+        </p:blipFill>
+        <p:spPr>
+          <a:xfrm>
+            <a:off x="5005889" y="2086911"/>
+            <a:ext cx="1683669" cy="3885390"/>
+          </a:xfrm>
+        </p:spPr>
+      </p:pic>
+      <p:sp>
+        <p:nvSpPr>
+          <p:cNvPr id="7" name="Flèche droite 6">
+            <a:hlinkClick r:id="rId3" action="ppaction://hlinksldjump"/>
+          </p:cNvPr>
+          <p:cNvSpPr/>
+          <p:nvPr/>
+        </p:nvSpPr>
+        <p:spPr>
+          <a:xfrm rot="10800000">
+            <a:off x="60575" y="6184232"/>
+            <a:ext cx="677362" cy="385010"/>
+          </a:xfrm>
+          <a:prstGeom prst="rightArrow">
+            <a:avLst/>
+          </a:prstGeom>
+        </p:spPr>
+        <p:style>
+          <a:lnRef idx="2">
+            <a:schemeClr val="accent1">
+              <a:shade val="50000"/>
+            </a:schemeClr>
+          </a:lnRef>
+          <a:fillRef idx="1">
+            <a:schemeClr val="accent1"/>
+          </a:fillRef>
+          <a:effectRef idx="0">
+            <a:schemeClr val="accent1"/>
+          </a:effectRef>
+          <a:fontRef idx="minor">
+            <a:schemeClr val="lt1"/>
+          </a:fontRef>
+        </p:style>
+        <p:txBody>
+          <a:bodyPr rtlCol="0" anchor="ctr"/>
+          <a:lstStyle/>
+          <a:p>
+            <a:pPr algn="ctr"/>
+            <a:endParaRPr lang="fr-FR"/>
+          </a:p>
+        </p:txBody>
+      </p:sp>
+      <p:sp>
+        <p:nvSpPr>
+          <p:cNvPr id="8" name="ZoneTexte 7"/>
+          <p:cNvSpPr txBox="1"/>
+          <p:nvPr/>
+        </p:nvSpPr>
+        <p:spPr>
+          <a:xfrm>
+            <a:off x="60574" y="6245932"/>
+            <a:ext cx="894765" cy="261610"/>
+          </a:xfrm>
+          <a:prstGeom prst="rect">
+            <a:avLst/>
+          </a:prstGeom>
+          <a:noFill/>
+        </p:spPr>
+        <p:txBody>
+          <a:bodyPr wrap="square" rtlCol="0">
+            <a:spAutoFit/>
+          </a:bodyPr>
+          <a:lstStyle/>
+          <a:p>
+            <a:r>
+              <a:rPr lang="fr-FR" sz="1100" dirty="0" smtClean="0">
+                <a:hlinkClick r:id="rId3" action="ppaction://hlinksldjump"/>
+              </a:rPr>
+              <a:t>Retour</a:t>
+            </a:r>
+            <a:endParaRPr lang="fr-FR" sz="1100" dirty="0"/>
+          </a:p>
+        </p:txBody>
+      </p:sp>
+    </p:spTree>
+    <p:extLst>
+      <p:ext uri="{BB962C8B-B14F-4D97-AF65-F5344CB8AC3E}">
+        <p14:creationId xmlns:p14="http://schemas.microsoft.com/office/powerpoint/2010/main" val="787197235"/>
+      </p:ext>
+    </p:extLst>
+  </p:cSld>
+  <p:clrMapOvr>
+    <a:masterClrMapping/>
+  </p:clrMapOvr>
+  <mc:AlternateContent xmlns:mc="http://schemas.openxmlformats.org/markup-compatibility/2006">
+    <mc:Choice xmlns:p14="http://schemas.microsoft.com/office/powerpoint/2010/main" Requires="p14">
+      <p:transition spd="slow" p14:dur="1200">
+        <p14:prism dir="u"/>
+      </p:transition>
+    </mc:Choice>
+    <mc:Fallback>
+      <p:transition spd="slow">
+        <p:fade/>
+      </p:transition>
+    </mc:Fallback>
+  </mc:AlternateContent>
+  <p:timing>
+    <p:tnLst>
+      <p:par>
+        <p:cTn id="1" dur="indefinite" restart="never" nodeType="tmRoot"/>
+      </p:par>
+    </p:tnLst>
+  </p:timing>
+</p:sld>
+</file>
+
+<file path=ppt/slides/slide21.xml><?xml version="1.0" encoding="utf-8"?>
+<p:sld xmlns:a="http://schemas.openxmlformats.org/drawingml/2006/main" xmlns:r="http://schemas.openxmlformats.org/officeDocument/2006/relationships" xmlns:p="http://schemas.openxmlformats.org/presentationml/2006/main" show="0">
+  <p:cSld>
+    <p:spTree>
+      <p:nvGrpSpPr>
+        <p:cNvPr id="1" name=""/>
+        <p:cNvGrpSpPr/>
+        <p:nvPr/>
+      </p:nvGrpSpPr>
+      <p:grpSpPr>
+        <a:xfrm>
+          <a:off x="0" y="0"/>
+          <a:ext cx="0" cy="0"/>
+          <a:chOff x="0" y="0"/>
+          <a:chExt cx="0" cy="0"/>
+        </a:xfrm>
+      </p:grpSpPr>
+      <p:sp>
+        <p:nvSpPr>
+          <p:cNvPr id="2" name="Titre 1"/>
+          <p:cNvSpPr>
+            <a:spLocks noGrp="1"/>
+          </p:cNvSpPr>
+          <p:nvPr>
+            <p:ph type="title"/>
+          </p:nvPr>
+        </p:nvSpPr>
+        <p:spPr/>
+        <p:txBody>
+          <a:bodyPr/>
+          <a:lstStyle/>
+          <a:p>
+            <a:r>
+              <a:rPr lang="fr-FR" dirty="0" smtClean="0"/>
+              <a:t>Arduino Nano</a:t>
+            </a:r>
+            <a:endParaRPr lang="fr-FR" dirty="0"/>
+          </a:p>
+        </p:txBody>
+      </p:sp>
+      <p:pic>
+        <p:nvPicPr>
+          <p:cNvPr id="4" name="Espace réservé du contenu 3"/>
+          <p:cNvPicPr>
+            <a:picLocks noGrp="1" noChangeAspect="1"/>
+          </p:cNvPicPr>
+          <p:nvPr>
+            <p:ph idx="1"/>
+          </p:nvPr>
+        </p:nvPicPr>
+        <p:blipFill>
+          <a:blip r:embed="rId2">
+            <a:extLst>
+              <a:ext uri="{28A0092B-C50C-407E-A947-70E740481C1C}">
+                <a14:useLocalDpi xmlns:a14="http://schemas.microsoft.com/office/drawing/2010/main" val="0"/>
+              </a:ext>
+            </a:extLst>
+          </a:blip>
+          <a:stretch>
+            <a:fillRect/>
+          </a:stretch>
+        </p:blipFill>
+        <p:spPr>
+          <a:xfrm>
+            <a:off x="3348064" y="2052638"/>
+            <a:ext cx="4457648" cy="4195762"/>
+          </a:xfrm>
+          <a:noFill/>
+          <a:ln>
+            <a:noFill/>
+          </a:ln>
+        </p:spPr>
+      </p:pic>
+      <p:sp>
+        <p:nvSpPr>
+          <p:cNvPr id="5" name="Flèche droite 4"/>
+          <p:cNvSpPr/>
+          <p:nvPr/>
+        </p:nvSpPr>
+        <p:spPr>
+          <a:xfrm rot="10800000">
+            <a:off x="60575" y="6184232"/>
+            <a:ext cx="677362" cy="385010"/>
+          </a:xfrm>
+          <a:prstGeom prst="rightArrow">
+            <a:avLst/>
+          </a:prstGeom>
+        </p:spPr>
+        <p:style>
+          <a:lnRef idx="2">
+            <a:schemeClr val="accent1">
+              <a:shade val="50000"/>
+            </a:schemeClr>
+          </a:lnRef>
+          <a:fillRef idx="1">
+            <a:schemeClr val="accent1"/>
+          </a:fillRef>
+          <a:effectRef idx="0">
+            <a:schemeClr val="accent1"/>
+          </a:effectRef>
+          <a:fontRef idx="minor">
+            <a:schemeClr val="lt1"/>
+          </a:fontRef>
+        </p:style>
+        <p:txBody>
+          <a:bodyPr rtlCol="0" anchor="ctr"/>
+          <a:lstStyle/>
+          <a:p>
+            <a:pPr algn="ctr"/>
+            <a:endParaRPr lang="fr-FR"/>
+          </a:p>
+        </p:txBody>
+      </p:sp>
+      <p:sp>
+        <p:nvSpPr>
+          <p:cNvPr id="6" name="ZoneTexte 5"/>
+          <p:cNvSpPr txBox="1"/>
+          <p:nvPr/>
+        </p:nvSpPr>
+        <p:spPr>
+          <a:xfrm>
+            <a:off x="60574" y="6245932"/>
+            <a:ext cx="894765" cy="261610"/>
+          </a:xfrm>
+          <a:prstGeom prst="rect">
+            <a:avLst/>
+          </a:prstGeom>
+          <a:noFill/>
+        </p:spPr>
+        <p:txBody>
+          <a:bodyPr wrap="square" rtlCol="0">
+            <a:spAutoFit/>
+          </a:bodyPr>
+          <a:lstStyle/>
+          <a:p>
+            <a:r>
+              <a:rPr lang="fr-FR" sz="1100" dirty="0" smtClean="0">
+                <a:hlinkClick r:id="rId3" action="ppaction://hlinksldjump"/>
+              </a:rPr>
+              <a:t>Retour</a:t>
+            </a:r>
+            <a:endParaRPr lang="fr-FR" sz="1100" dirty="0"/>
+          </a:p>
+        </p:txBody>
+      </p:sp>
+    </p:spTree>
+    <p:extLst>
+      <p:ext uri="{BB962C8B-B14F-4D97-AF65-F5344CB8AC3E}">
+        <p14:creationId xmlns:p14="http://schemas.microsoft.com/office/powerpoint/2010/main" val="2334483331"/>
+      </p:ext>
+    </p:extLst>
+  </p:cSld>
+  <p:clrMapOvr>
+    <a:masterClrMapping/>
+  </p:clrMapOvr>
+  <mc:AlternateContent xmlns:mc="http://schemas.openxmlformats.org/markup-compatibility/2006">
+    <mc:Choice xmlns:p14="http://schemas.microsoft.com/office/powerpoint/2010/main" Requires="p14">
+      <p:transition spd="slow" p14:dur="1200">
+        <p14:prism dir="u"/>
       </p:transition>
     </mc:Choice>
     <mc:Fallback>
@@ -8693,8 +10569,8 @@
   </p:clrMapOvr>
   <mc:AlternateContent xmlns:mc="http://schemas.openxmlformats.org/markup-compatibility/2006">
     <mc:Choice xmlns:p14="http://schemas.microsoft.com/office/powerpoint/2010/main" Requires="p14">
-      <p:transition spd="slow" p14:dur="3000">
-        <p14:shred/>
+      <p:transition spd="slow" p14:dur="1200">
+        <p14:prism dir="u"/>
       </p:transition>
     </mc:Choice>
     <mc:Fallback>
@@ -8799,8 +10675,8 @@
   </p:clrMapOvr>
   <mc:AlternateContent xmlns:mc="http://schemas.openxmlformats.org/markup-compatibility/2006">
     <mc:Choice xmlns:p14="http://schemas.microsoft.com/office/powerpoint/2010/main" Requires="p14">
-      <p:transition spd="slow" p14:dur="4000">
-        <p14:vortex dir="r"/>
+      <p:transition spd="slow" p14:dur="1200">
+        <p14:prism dir="u"/>
       </p:transition>
     </mc:Choice>
     <mc:Fallback>
@@ -8923,8 +10799,8 @@
   </p:clrMapOvr>
   <mc:AlternateContent xmlns:mc="http://schemas.openxmlformats.org/markup-compatibility/2006">
     <mc:Choice xmlns:p14="http://schemas.microsoft.com/office/powerpoint/2010/main" Requires="p14">
-      <p:transition spd="slow" p14:dur="1600">
-        <p14:conveyor dir="l"/>
+      <p:transition spd="slow" p14:dur="1400">
+        <p14:doors dir="vert"/>
       </p:transition>
     </mc:Choice>
     <mc:Fallback>
@@ -9040,8 +10916,8 @@
   </p:clrMapOvr>
   <mc:AlternateContent xmlns:mc="http://schemas.openxmlformats.org/markup-compatibility/2006">
     <mc:Choice xmlns:p14="http://schemas.microsoft.com/office/powerpoint/2010/main" Requires="p14">
-      <p:transition spd="slow" p14:dur="1600">
-        <p14:conveyor dir="l"/>
+      <p:transition spd="slow" p14:dur="1400">
+        <p14:doors/>
       </p:transition>
     </mc:Choice>
     <mc:Fallback>
@@ -9151,8 +11027,8 @@
   </p:clrMapOvr>
   <mc:AlternateContent xmlns:mc="http://schemas.openxmlformats.org/markup-compatibility/2006">
     <mc:Choice xmlns:p14="http://schemas.microsoft.com/office/powerpoint/2010/main" Requires="p14">
-      <p:transition spd="slow" p14:dur="1600">
-        <p14:conveyor dir="l"/>
+      <p:transition spd="slow" p14:dur="1400">
+        <p14:doors dir="vert"/>
       </p:transition>
     </mc:Choice>
     <mc:Fallback>
@@ -9190,7 +11066,7 @@
       </p:grpSpPr>
       <p:sp>
         <p:nvSpPr>
-          <p:cNvPr id="4" name="Titre 3"/>
+          <p:cNvPr id="2" name="Titre 1"/>
           <p:cNvSpPr>
             <a:spLocks noGrp="1"/>
           </p:cNvSpPr>
@@ -9200,14 +11076,14 @@
         </p:nvSpPr>
         <p:spPr/>
         <p:txBody>
-          <a:bodyPr rtlCol="0"/>
-          <a:lstStyle/>
-          <a:p>
-            <a:pPr algn="ctr" rtl="0"/>
-            <a:r>
-              <a:rPr lang="fr-FR" dirty="0"/>
-              <a:t>L’équipe</a:t>
-            </a:r>
+          <a:bodyPr/>
+          <a:lstStyle/>
+          <a:p>
+            <a:r>
+              <a:rPr lang="fr-FR" dirty="0" smtClean="0"/>
+              <a:t>Diagramme de Block :</a:t>
+            </a:r>
+            <a:endParaRPr lang="fr-FR" dirty="0"/>
           </a:p>
         </p:txBody>
       </p:sp>
@@ -9223,65 +11099,27 @@
         </p:nvSpPr>
         <p:spPr/>
         <p:txBody>
-          <a:bodyPr rtlCol="0">
-            <a:normAutofit/>
-          </a:bodyPr>
-          <a:lstStyle/>
-          <a:p>
-            <a:pPr marL="0" indent="0" rtl="0">
-              <a:buNone/>
-            </a:pPr>
-            <a:r>
-              <a:rPr lang="fr-FR" sz="2400" dirty="0" smtClean="0"/>
-              <a:t>	L’équipe est composée de 3 personnes ayant chacun un rôle défini :</a:t>
-            </a:r>
-          </a:p>
-          <a:p>
-            <a:pPr rtl="0"/>
-            <a:r>
-              <a:rPr lang="fr-FR" sz="2400" dirty="0" smtClean="0"/>
-              <a:t>Ferrer-</a:t>
-            </a:r>
-            <a:r>
-              <a:rPr lang="fr-FR" sz="2400" dirty="0" err="1" smtClean="0"/>
-              <a:t>Doriol</a:t>
-            </a:r>
-            <a:r>
-              <a:rPr lang="fr-FR" sz="2400" dirty="0" smtClean="0"/>
-              <a:t> Denis, qui s’occupera de la partie récupération de données via l’application mobile</a:t>
-            </a:r>
-            <a:endParaRPr lang="fr-FR" sz="2400" dirty="0"/>
-          </a:p>
-          <a:p>
-            <a:pPr rtl="0"/>
-            <a:r>
-              <a:rPr lang="fr-FR" sz="2400" dirty="0" smtClean="0"/>
-              <a:t>Duparc Quentin, qui s’occupera de la partie GSM et de l’envoie de SMS en cas de vol</a:t>
-            </a:r>
-          </a:p>
-          <a:p>
-            <a:pPr rtl="0"/>
-            <a:r>
-              <a:rPr lang="fr-FR" sz="2400" dirty="0" err="1" smtClean="0"/>
-              <a:t>Prévéral</a:t>
-            </a:r>
-            <a:r>
-              <a:rPr lang="fr-FR" sz="2400" dirty="0" smtClean="0"/>
-              <a:t>	Duncan, qui réalisera le programme pour les différents capteurs et pour le stockage des données sur la carte SD</a:t>
-            </a:r>
-            <a:endParaRPr lang="fr-FR" sz="2400" dirty="0"/>
+          <a:bodyPr/>
+          <a:lstStyle/>
+          <a:p>
+            <a:endParaRPr lang="fr-FR"/>
           </a:p>
         </p:txBody>
       </p:sp>
     </p:spTree>
+    <p:extLst>
+      <p:ext uri="{BB962C8B-B14F-4D97-AF65-F5344CB8AC3E}">
+        <p14:creationId xmlns:p14="http://schemas.microsoft.com/office/powerpoint/2010/main" val="1373846520"/>
+      </p:ext>
+    </p:extLst>
   </p:cSld>
   <p:clrMapOvr>
     <a:masterClrMapping/>
   </p:clrMapOvr>
   <mc:AlternateContent xmlns:mc="http://schemas.openxmlformats.org/markup-compatibility/2006">
-    <mc:Choice xmlns:p15="http://schemas.microsoft.com/office/powerpoint/2012/main" Requires="p15">
-      <p:transition xmlns:p14="http://schemas.microsoft.com/office/powerpoint/2010/main" spd="slow" p14:dur="2000">
-        <p15:prstTrans prst="wind"/>
+    <mc:Choice xmlns:p14="http://schemas.microsoft.com/office/powerpoint/2010/main" Requires="p14">
+      <p:transition spd="slow" p14:dur="1400">
+        <p14:doors/>
       </p:transition>
     </mc:Choice>
     <mc:Fallback>
@@ -9332,10 +11170,10 @@
           <a:bodyPr rtlCol="0"/>
           <a:lstStyle/>
           <a:p>
-            <a:pPr rtl="0"/>
+            <a:pPr algn="ctr" rtl="0"/>
             <a:r>
               <a:rPr lang="fr-FR" dirty="0"/>
-              <a:t>Ressources nécessaires</a:t>
+              <a:t>L’équipe</a:t>
             </a:r>
           </a:p>
         </p:txBody>
@@ -9352,67 +11190,60 @@
         </p:nvSpPr>
         <p:spPr/>
         <p:txBody>
-          <a:bodyPr rtlCol="0"/>
-          <a:lstStyle/>
-          <a:p>
-            <a:pPr rtl="0"/>
-            <a:r>
-              <a:rPr lang="fr-FR" dirty="0" smtClean="0"/>
-              <a:t>Module micro SD</a:t>
-            </a:r>
-          </a:p>
-          <a:p>
-            <a:pPr rtl="0"/>
-            <a:r>
-              <a:rPr lang="fr-FR" dirty="0" err="1" smtClean="0"/>
-              <a:t>Buzzer</a:t>
-            </a:r>
-            <a:r>
-              <a:rPr lang="fr-FR" dirty="0" smtClean="0"/>
-              <a:t> piézo</a:t>
-            </a:r>
-            <a:r>
-              <a:rPr lang="fr-FR" dirty="0" smtClean="0"/>
-              <a:t>él</a:t>
-            </a:r>
-            <a:r>
-              <a:rPr lang="fr-FR" dirty="0" smtClean="0"/>
-              <a:t>ectrique</a:t>
-            </a:r>
-          </a:p>
-          <a:p>
-            <a:pPr rtl="0"/>
-            <a:r>
-              <a:rPr lang="fr-FR" dirty="0" smtClean="0"/>
-              <a:t>Capteur GPS avec une sortie NMEA</a:t>
-            </a:r>
-          </a:p>
-          <a:p>
-            <a:pPr rtl="0"/>
-            <a:r>
-              <a:rPr lang="fr-FR" dirty="0" smtClean="0"/>
-              <a:t>Tablette avec un OS </a:t>
-            </a:r>
-            <a:r>
-              <a:rPr lang="fr-FR" dirty="0" err="1" smtClean="0"/>
-              <a:t>android</a:t>
-            </a:r>
-            <a:endParaRPr lang="fr-FR" dirty="0" smtClean="0"/>
-          </a:p>
-          <a:p>
-            <a:pPr rtl="0"/>
-            <a:r>
-              <a:rPr lang="fr-FR" dirty="0" err="1" smtClean="0"/>
-              <a:t>Telephone</a:t>
-            </a:r>
-            <a:r>
-              <a:rPr lang="fr-FR" dirty="0" smtClean="0"/>
-              <a:t> avec une carte SIM</a:t>
-            </a:r>
-          </a:p>
-          <a:p>
-            <a:pPr rtl="0"/>
-            <a:endParaRPr lang="fr-FR" dirty="0"/>
+          <a:bodyPr rtlCol="0">
+            <a:normAutofit/>
+          </a:bodyPr>
+          <a:lstStyle/>
+          <a:p>
+            <a:pPr marL="0" indent="0" rtl="0">
+              <a:buNone/>
+            </a:pPr>
+            <a:r>
+              <a:rPr lang="fr-FR" sz="2400" dirty="0" smtClean="0"/>
+              <a:t>	L’équipe est composée de 3 personnes ayant chacun un rôle défini :</a:t>
+            </a:r>
+          </a:p>
+          <a:p>
+            <a:pPr rtl="0"/>
+            <a:r>
+              <a:rPr lang="fr-FR" sz="2400" dirty="0" smtClean="0">
+                <a:hlinkClick r:id="rId3" action="ppaction://hlinksldjump"/>
+              </a:rPr>
+              <a:t>Duparc Quentin</a:t>
+            </a:r>
+            <a:r>
+              <a:rPr lang="fr-FR" sz="2400" dirty="0" smtClean="0"/>
+              <a:t>, qui s’occupera de la partie GSM et de l’envoie de SMS en cas de vol</a:t>
+            </a:r>
+          </a:p>
+          <a:p>
+            <a:pPr rtl="0"/>
+            <a:r>
+              <a:rPr lang="fr-FR" sz="2400" dirty="0" smtClean="0">
+                <a:hlinkClick r:id="rId4" action="ppaction://hlinksldjump"/>
+              </a:rPr>
+              <a:t>Prévéral Duncan</a:t>
+            </a:r>
+            <a:r>
+              <a:rPr lang="fr-FR" sz="2400" dirty="0" smtClean="0"/>
+              <a:t>, qui réalisera le programme pour les différents capteurs et pour le stockage des données sur la carte SD</a:t>
+            </a:r>
+          </a:p>
+          <a:p>
+            <a:r>
+              <a:rPr lang="fr-FR" sz="2400" dirty="0">
+                <a:hlinkClick r:id="rId5" action="ppaction://hlinksldjump"/>
+              </a:rPr>
+              <a:t>Ferrer-Doriol Denis</a:t>
+            </a:r>
+            <a:r>
+              <a:rPr lang="fr-FR" sz="2400" dirty="0"/>
+              <a:t>, qui s’occupera de la partie récupération de données via l’application mobile</a:t>
+            </a:r>
+          </a:p>
+          <a:p>
+            <a:pPr rtl="0"/>
+            <a:endParaRPr lang="fr-FR" sz="2400" dirty="0"/>
           </a:p>
         </p:txBody>
       </p:sp>
@@ -9423,8 +11254,8 @@
   </p:clrMapOvr>
   <mc:AlternateContent xmlns:mc="http://schemas.openxmlformats.org/markup-compatibility/2006">
     <mc:Choice xmlns:p14="http://schemas.microsoft.com/office/powerpoint/2010/main" Requires="p14">
-      <p:transition spd="slow" p14:dur="1600">
-        <p14:prism isContent="1" isInverted="1"/>
+      <p:transition spd="slow" p14:dur="1200">
+        <p14:prism dir="u"/>
       </p:transition>
     </mc:Choice>
     <mc:Fallback>

</xml_diff>